<commit_message>
Updated Kscope slides to match new presentation.
</commit_message>
<xml_diff>
--- a/presentations/Method5 Remote Execution - KSCOPE 18 Jon Heller.pptx
+++ b/presentations/Method5 Remote Execution - KSCOPE 18 Jon Heller.pptx
@@ -222,7 +222,7 @@
           <a:p>
             <a:fld id="{E8184847-EC06-4734-8E30-343A2DA340C9}" type="datetimeFigureOut">
               <a:rPr lang="en-US" smtClean="0"/>
-              <a:t>5/12/2018</a:t>
+              <a:t>6/9/2018</a:t>
             </a:fld>
             <a:endParaRPr lang="en-US"/>
           </a:p>
@@ -387,7 +387,7 @@
           <a:p>
             <a:fld id="{DC284B00-8F05-4CB2-A4E6-4A642AFA915E}" type="datetimeFigureOut">
               <a:rPr lang="en-US" smtClean="0"/>
-              <a:t>5/12/2018</a:t>
+              <a:t>6/9/2018</a:t>
             </a:fld>
             <a:endParaRPr lang="en-US"/>
           </a:p>
@@ -5429,7 +5429,7 @@
           <p:cNvPr id="2" name="Title 1">
             <a:extLst>
               <a:ext uri="{FF2B5EF4-FFF2-40B4-BE49-F238E27FC236}">
-                <a16:creationId xmlns:a16="http://schemas.microsoft.com/office/drawing/2014/main" xmlns="" id="{E7BD2540-84A7-4AD8-854F-C80A35294E9E}"/>
+                <a16:creationId xmlns="" xmlns:a16="http://schemas.microsoft.com/office/drawing/2014/main" id="{E7BD2540-84A7-4AD8-854F-C80A35294E9E}"/>
               </a:ext>
             </a:extLst>
           </p:cNvPr>
@@ -5466,7 +5466,7 @@
           <p:cNvPr id="3" name="Subtitle 2">
             <a:extLst>
               <a:ext uri="{FF2B5EF4-FFF2-40B4-BE49-F238E27FC236}">
-                <a16:creationId xmlns:a16="http://schemas.microsoft.com/office/drawing/2014/main" xmlns="" id="{7EAE7176-FD78-412C-ABC8-93FFCA3D6249}"/>
+                <a16:creationId xmlns="" xmlns:a16="http://schemas.microsoft.com/office/drawing/2014/main" id="{7EAE7176-FD78-412C-ABC8-93FFCA3D6249}"/>
               </a:ext>
             </a:extLst>
           </p:cNvPr>
@@ -5536,7 +5536,7 @@
           <p:cNvPr id="4" name="Date Placeholder 3">
             <a:extLst>
               <a:ext uri="{FF2B5EF4-FFF2-40B4-BE49-F238E27FC236}">
-                <a16:creationId xmlns:a16="http://schemas.microsoft.com/office/drawing/2014/main" xmlns="" id="{2E78DEDD-B8AE-46DA-9665-C7B425BD20AE}"/>
+                <a16:creationId xmlns="" xmlns:a16="http://schemas.microsoft.com/office/drawing/2014/main" id="{2E78DEDD-B8AE-46DA-9665-C7B425BD20AE}"/>
               </a:ext>
             </a:extLst>
           </p:cNvPr>
@@ -5561,7 +5561,7 @@
                 </a:solidFill>
               </a:rPr>
               <a:pPr/>
-              <a:t>5/12/2018</a:t>
+              <a:t>6/9/2018</a:t>
             </a:fld>
             <a:endParaRPr lang="en-US">
               <a:solidFill>
@@ -5578,7 +5578,7 @@
           <p:cNvPr id="5" name="Footer Placeholder 4">
             <a:extLst>
               <a:ext uri="{FF2B5EF4-FFF2-40B4-BE49-F238E27FC236}">
-                <a16:creationId xmlns:a16="http://schemas.microsoft.com/office/drawing/2014/main" xmlns="" id="{733DF7F5-4CCD-42A1-8BEC-84C33CCB3588}"/>
+                <a16:creationId xmlns="" xmlns:a16="http://schemas.microsoft.com/office/drawing/2014/main" id="{733DF7F5-4CCD-42A1-8BEC-84C33CCB3588}"/>
               </a:ext>
             </a:extLst>
           </p:cNvPr>
@@ -5609,7 +5609,7 @@
           <p:cNvPr id="6" name="Slide Number Placeholder 5">
             <a:extLst>
               <a:ext uri="{FF2B5EF4-FFF2-40B4-BE49-F238E27FC236}">
-                <a16:creationId xmlns:a16="http://schemas.microsoft.com/office/drawing/2014/main" xmlns="" id="{3C83BE63-BD89-4BFC-86B4-954A58C10EE7}"/>
+                <a16:creationId xmlns="" xmlns:a16="http://schemas.microsoft.com/office/drawing/2014/main" id="{3C83BE63-BD89-4BFC-86B4-954A58C10EE7}"/>
               </a:ext>
             </a:extLst>
           </p:cNvPr>
@@ -5681,7 +5681,7 @@
           <p:cNvPr id="2" name="Title 1">
             <a:extLst>
               <a:ext uri="{FF2B5EF4-FFF2-40B4-BE49-F238E27FC236}">
-                <a16:creationId xmlns:a16="http://schemas.microsoft.com/office/drawing/2014/main" xmlns="" id="{939DE534-1297-495C-B411-11CB7463F8A6}"/>
+                <a16:creationId xmlns="" xmlns:a16="http://schemas.microsoft.com/office/drawing/2014/main" id="{939DE534-1297-495C-B411-11CB7463F8A6}"/>
               </a:ext>
             </a:extLst>
           </p:cNvPr>
@@ -5709,7 +5709,7 @@
           <p:cNvPr id="3" name="Content Placeholder 2">
             <a:extLst>
               <a:ext uri="{FF2B5EF4-FFF2-40B4-BE49-F238E27FC236}">
-                <a16:creationId xmlns:a16="http://schemas.microsoft.com/office/drawing/2014/main" xmlns="" id="{3FFD3F06-E6BB-4639-ACBF-59610AA62CDB}"/>
+                <a16:creationId xmlns="" xmlns:a16="http://schemas.microsoft.com/office/drawing/2014/main" id="{3FFD3F06-E6BB-4639-ACBF-59610AA62CDB}"/>
               </a:ext>
             </a:extLst>
           </p:cNvPr>
@@ -5766,7 +5766,7 @@
           <p:cNvPr id="4" name="Date Placeholder 3">
             <a:extLst>
               <a:ext uri="{FF2B5EF4-FFF2-40B4-BE49-F238E27FC236}">
-                <a16:creationId xmlns:a16="http://schemas.microsoft.com/office/drawing/2014/main" xmlns="" id="{58631C80-50D5-4D23-9434-B5A6861A0ED3}"/>
+                <a16:creationId xmlns="" xmlns:a16="http://schemas.microsoft.com/office/drawing/2014/main" id="{58631C80-50D5-4D23-9434-B5A6861A0ED3}"/>
               </a:ext>
             </a:extLst>
           </p:cNvPr>
@@ -5791,7 +5791,7 @@
                 </a:solidFill>
               </a:rPr>
               <a:pPr/>
-              <a:t>5/12/2018</a:t>
+              <a:t>6/9/2018</a:t>
             </a:fld>
             <a:endParaRPr lang="en-US">
               <a:solidFill>
@@ -5808,7 +5808,7 @@
           <p:cNvPr id="5" name="Footer Placeholder 4">
             <a:extLst>
               <a:ext uri="{FF2B5EF4-FFF2-40B4-BE49-F238E27FC236}">
-                <a16:creationId xmlns:a16="http://schemas.microsoft.com/office/drawing/2014/main" xmlns="" id="{0233F747-602E-409A-BF2A-4E186590CA09}"/>
+                <a16:creationId xmlns="" xmlns:a16="http://schemas.microsoft.com/office/drawing/2014/main" id="{0233F747-602E-409A-BF2A-4E186590CA09}"/>
               </a:ext>
             </a:extLst>
           </p:cNvPr>
@@ -5839,7 +5839,7 @@
           <p:cNvPr id="6" name="Slide Number Placeholder 5">
             <a:extLst>
               <a:ext uri="{FF2B5EF4-FFF2-40B4-BE49-F238E27FC236}">
-                <a16:creationId xmlns:a16="http://schemas.microsoft.com/office/drawing/2014/main" xmlns="" id="{83399478-9340-4CD4-BC2C-A082B04C8CF9}"/>
+                <a16:creationId xmlns="" xmlns:a16="http://schemas.microsoft.com/office/drawing/2014/main" id="{83399478-9340-4CD4-BC2C-A082B04C8CF9}"/>
               </a:ext>
             </a:extLst>
           </p:cNvPr>
@@ -5911,7 +5911,7 @@
           <p:cNvPr id="2" name="Title 1">
             <a:extLst>
               <a:ext uri="{FF2B5EF4-FFF2-40B4-BE49-F238E27FC236}">
-                <a16:creationId xmlns:a16="http://schemas.microsoft.com/office/drawing/2014/main" xmlns="" id="{575FC5FE-775C-487B-8AFB-5C98FDEE50F1}"/>
+                <a16:creationId xmlns="" xmlns:a16="http://schemas.microsoft.com/office/drawing/2014/main" id="{575FC5FE-775C-487B-8AFB-5C98FDEE50F1}"/>
               </a:ext>
             </a:extLst>
           </p:cNvPr>
@@ -5948,7 +5948,7 @@
           <p:cNvPr id="3" name="Text Placeholder 2">
             <a:extLst>
               <a:ext uri="{FF2B5EF4-FFF2-40B4-BE49-F238E27FC236}">
-                <a16:creationId xmlns:a16="http://schemas.microsoft.com/office/drawing/2014/main" xmlns="" id="{DE930465-A4BA-4821-8C70-BBCBDA3FC489}"/>
+                <a16:creationId xmlns="" xmlns:a16="http://schemas.microsoft.com/office/drawing/2014/main" id="{DE930465-A4BA-4821-8C70-BBCBDA3FC489}"/>
               </a:ext>
             </a:extLst>
           </p:cNvPr>
@@ -6073,7 +6073,7 @@
           <p:cNvPr id="4" name="Date Placeholder 3">
             <a:extLst>
               <a:ext uri="{FF2B5EF4-FFF2-40B4-BE49-F238E27FC236}">
-                <a16:creationId xmlns:a16="http://schemas.microsoft.com/office/drawing/2014/main" xmlns="" id="{71E1365C-15A3-45AA-A6C9-D4328FD37EE9}"/>
+                <a16:creationId xmlns="" xmlns:a16="http://schemas.microsoft.com/office/drawing/2014/main" id="{71E1365C-15A3-45AA-A6C9-D4328FD37EE9}"/>
               </a:ext>
             </a:extLst>
           </p:cNvPr>
@@ -6098,7 +6098,7 @@
                 </a:solidFill>
               </a:rPr>
               <a:pPr/>
-              <a:t>5/12/2018</a:t>
+              <a:t>6/9/2018</a:t>
             </a:fld>
             <a:endParaRPr lang="en-US">
               <a:solidFill>
@@ -6115,7 +6115,7 @@
           <p:cNvPr id="5" name="Footer Placeholder 4">
             <a:extLst>
               <a:ext uri="{FF2B5EF4-FFF2-40B4-BE49-F238E27FC236}">
-                <a16:creationId xmlns:a16="http://schemas.microsoft.com/office/drawing/2014/main" xmlns="" id="{33F52984-E0DE-409F-A3CD-BBAC654C10E9}"/>
+                <a16:creationId xmlns="" xmlns:a16="http://schemas.microsoft.com/office/drawing/2014/main" id="{33F52984-E0DE-409F-A3CD-BBAC654C10E9}"/>
               </a:ext>
             </a:extLst>
           </p:cNvPr>
@@ -6146,7 +6146,7 @@
           <p:cNvPr id="6" name="Slide Number Placeholder 5">
             <a:extLst>
               <a:ext uri="{FF2B5EF4-FFF2-40B4-BE49-F238E27FC236}">
-                <a16:creationId xmlns:a16="http://schemas.microsoft.com/office/drawing/2014/main" xmlns="" id="{20499C0C-6588-4BE0-9289-62182D2F36CA}"/>
+                <a16:creationId xmlns="" xmlns:a16="http://schemas.microsoft.com/office/drawing/2014/main" id="{20499C0C-6588-4BE0-9289-62182D2F36CA}"/>
               </a:ext>
             </a:extLst>
           </p:cNvPr>
@@ -6218,7 +6218,7 @@
           <p:cNvPr id="2" name="Title 1">
             <a:extLst>
               <a:ext uri="{FF2B5EF4-FFF2-40B4-BE49-F238E27FC236}">
-                <a16:creationId xmlns:a16="http://schemas.microsoft.com/office/drawing/2014/main" xmlns="" id="{70290923-15AC-4F05-9178-FB251CE0696E}"/>
+                <a16:creationId xmlns="" xmlns:a16="http://schemas.microsoft.com/office/drawing/2014/main" id="{70290923-15AC-4F05-9178-FB251CE0696E}"/>
               </a:ext>
             </a:extLst>
           </p:cNvPr>
@@ -6246,7 +6246,7 @@
           <p:cNvPr id="3" name="Content Placeholder 2">
             <a:extLst>
               <a:ext uri="{FF2B5EF4-FFF2-40B4-BE49-F238E27FC236}">
-                <a16:creationId xmlns:a16="http://schemas.microsoft.com/office/drawing/2014/main" xmlns="" id="{ED706FA5-ED5D-482C-8E03-29576DCCBF36}"/>
+                <a16:creationId xmlns="" xmlns:a16="http://schemas.microsoft.com/office/drawing/2014/main" id="{ED706FA5-ED5D-482C-8E03-29576DCCBF36}"/>
               </a:ext>
             </a:extLst>
           </p:cNvPr>
@@ -6308,7 +6308,7 @@
           <p:cNvPr id="4" name="Content Placeholder 3">
             <a:extLst>
               <a:ext uri="{FF2B5EF4-FFF2-40B4-BE49-F238E27FC236}">
-                <a16:creationId xmlns:a16="http://schemas.microsoft.com/office/drawing/2014/main" xmlns="" id="{238EBFB8-153B-407C-A4A2-AC06C9EC0C75}"/>
+                <a16:creationId xmlns="" xmlns:a16="http://schemas.microsoft.com/office/drawing/2014/main" id="{238EBFB8-153B-407C-A4A2-AC06C9EC0C75}"/>
               </a:ext>
             </a:extLst>
           </p:cNvPr>
@@ -6370,7 +6370,7 @@
           <p:cNvPr id="5" name="Date Placeholder 4">
             <a:extLst>
               <a:ext uri="{FF2B5EF4-FFF2-40B4-BE49-F238E27FC236}">
-                <a16:creationId xmlns:a16="http://schemas.microsoft.com/office/drawing/2014/main" xmlns="" id="{4E075747-22B9-4157-956B-B3B734259359}"/>
+                <a16:creationId xmlns="" xmlns:a16="http://schemas.microsoft.com/office/drawing/2014/main" id="{4E075747-22B9-4157-956B-B3B734259359}"/>
               </a:ext>
             </a:extLst>
           </p:cNvPr>
@@ -6395,7 +6395,7 @@
                 </a:solidFill>
               </a:rPr>
               <a:pPr/>
-              <a:t>5/12/2018</a:t>
+              <a:t>6/9/2018</a:t>
             </a:fld>
             <a:endParaRPr lang="en-US">
               <a:solidFill>
@@ -6412,7 +6412,7 @@
           <p:cNvPr id="6" name="Footer Placeholder 5">
             <a:extLst>
               <a:ext uri="{FF2B5EF4-FFF2-40B4-BE49-F238E27FC236}">
-                <a16:creationId xmlns:a16="http://schemas.microsoft.com/office/drawing/2014/main" xmlns="" id="{C018ED5C-9821-4EA6-9C4E-5F8B44A2E895}"/>
+                <a16:creationId xmlns="" xmlns:a16="http://schemas.microsoft.com/office/drawing/2014/main" id="{C018ED5C-9821-4EA6-9C4E-5F8B44A2E895}"/>
               </a:ext>
             </a:extLst>
           </p:cNvPr>
@@ -6443,7 +6443,7 @@
           <p:cNvPr id="7" name="Slide Number Placeholder 6">
             <a:extLst>
               <a:ext uri="{FF2B5EF4-FFF2-40B4-BE49-F238E27FC236}">
-                <a16:creationId xmlns:a16="http://schemas.microsoft.com/office/drawing/2014/main" xmlns="" id="{0F3799DC-05CF-495E-9173-BA6A7F91CDB9}"/>
+                <a16:creationId xmlns="" xmlns:a16="http://schemas.microsoft.com/office/drawing/2014/main" id="{0F3799DC-05CF-495E-9173-BA6A7F91CDB9}"/>
               </a:ext>
             </a:extLst>
           </p:cNvPr>
@@ -6515,7 +6515,7 @@
           <p:cNvPr id="2" name="Title 1">
             <a:extLst>
               <a:ext uri="{FF2B5EF4-FFF2-40B4-BE49-F238E27FC236}">
-                <a16:creationId xmlns:a16="http://schemas.microsoft.com/office/drawing/2014/main" xmlns="" id="{CCB2671A-676F-4B01-AC8C-D664E21AE47D}"/>
+                <a16:creationId xmlns="" xmlns:a16="http://schemas.microsoft.com/office/drawing/2014/main" id="{CCB2671A-676F-4B01-AC8C-D664E21AE47D}"/>
               </a:ext>
             </a:extLst>
           </p:cNvPr>
@@ -6548,7 +6548,7 @@
           <p:cNvPr id="3" name="Text Placeholder 2">
             <a:extLst>
               <a:ext uri="{FF2B5EF4-FFF2-40B4-BE49-F238E27FC236}">
-                <a16:creationId xmlns:a16="http://schemas.microsoft.com/office/drawing/2014/main" xmlns="" id="{66801F75-62DF-4942-8FF1-3ECB14BD69B8}"/>
+                <a16:creationId xmlns="" xmlns:a16="http://schemas.microsoft.com/office/drawing/2014/main" id="{66801F75-62DF-4942-8FF1-3ECB14BD69B8}"/>
               </a:ext>
             </a:extLst>
           </p:cNvPr>
@@ -6619,7 +6619,7 @@
           <p:cNvPr id="4" name="Content Placeholder 3">
             <a:extLst>
               <a:ext uri="{FF2B5EF4-FFF2-40B4-BE49-F238E27FC236}">
-                <a16:creationId xmlns:a16="http://schemas.microsoft.com/office/drawing/2014/main" xmlns="" id="{EDAAEB69-7C59-4F5E-934C-935126FAE108}"/>
+                <a16:creationId xmlns="" xmlns:a16="http://schemas.microsoft.com/office/drawing/2014/main" id="{EDAAEB69-7C59-4F5E-934C-935126FAE108}"/>
               </a:ext>
             </a:extLst>
           </p:cNvPr>
@@ -6681,7 +6681,7 @@
           <p:cNvPr id="5" name="Text Placeholder 4">
             <a:extLst>
               <a:ext uri="{FF2B5EF4-FFF2-40B4-BE49-F238E27FC236}">
-                <a16:creationId xmlns:a16="http://schemas.microsoft.com/office/drawing/2014/main" xmlns="" id="{89C51BED-0574-410B-8630-E8AACAD7FE14}"/>
+                <a16:creationId xmlns="" xmlns:a16="http://schemas.microsoft.com/office/drawing/2014/main" id="{89C51BED-0574-410B-8630-E8AACAD7FE14}"/>
               </a:ext>
             </a:extLst>
           </p:cNvPr>
@@ -6752,7 +6752,7 @@
           <p:cNvPr id="6" name="Content Placeholder 5">
             <a:extLst>
               <a:ext uri="{FF2B5EF4-FFF2-40B4-BE49-F238E27FC236}">
-                <a16:creationId xmlns:a16="http://schemas.microsoft.com/office/drawing/2014/main" xmlns="" id="{0AAE740E-F38D-4AF5-A7A4-BC083B03F543}"/>
+                <a16:creationId xmlns="" xmlns:a16="http://schemas.microsoft.com/office/drawing/2014/main" id="{0AAE740E-F38D-4AF5-A7A4-BC083B03F543}"/>
               </a:ext>
             </a:extLst>
           </p:cNvPr>
@@ -6814,7 +6814,7 @@
           <p:cNvPr id="7" name="Date Placeholder 6">
             <a:extLst>
               <a:ext uri="{FF2B5EF4-FFF2-40B4-BE49-F238E27FC236}">
-                <a16:creationId xmlns:a16="http://schemas.microsoft.com/office/drawing/2014/main" xmlns="" id="{671EF39E-0AD5-46D0-8B67-47F90204AD03}"/>
+                <a16:creationId xmlns="" xmlns:a16="http://schemas.microsoft.com/office/drawing/2014/main" id="{671EF39E-0AD5-46D0-8B67-47F90204AD03}"/>
               </a:ext>
             </a:extLst>
           </p:cNvPr>
@@ -6839,7 +6839,7 @@
                 </a:solidFill>
               </a:rPr>
               <a:pPr/>
-              <a:t>5/12/2018</a:t>
+              <a:t>6/9/2018</a:t>
             </a:fld>
             <a:endParaRPr lang="en-US">
               <a:solidFill>
@@ -6856,7 +6856,7 @@
           <p:cNvPr id="8" name="Footer Placeholder 7">
             <a:extLst>
               <a:ext uri="{FF2B5EF4-FFF2-40B4-BE49-F238E27FC236}">
-                <a16:creationId xmlns:a16="http://schemas.microsoft.com/office/drawing/2014/main" xmlns="" id="{3F67A599-9BB6-4185-9371-122BF356292A}"/>
+                <a16:creationId xmlns="" xmlns:a16="http://schemas.microsoft.com/office/drawing/2014/main" id="{3F67A599-9BB6-4185-9371-122BF356292A}"/>
               </a:ext>
             </a:extLst>
           </p:cNvPr>
@@ -6887,7 +6887,7 @@
           <p:cNvPr id="9" name="Slide Number Placeholder 8">
             <a:extLst>
               <a:ext uri="{FF2B5EF4-FFF2-40B4-BE49-F238E27FC236}">
-                <a16:creationId xmlns:a16="http://schemas.microsoft.com/office/drawing/2014/main" xmlns="" id="{A4CF2D55-9BC0-4BF3-BF32-C4F159860ED6}"/>
+                <a16:creationId xmlns="" xmlns:a16="http://schemas.microsoft.com/office/drawing/2014/main" id="{A4CF2D55-9BC0-4BF3-BF32-C4F159860ED6}"/>
               </a:ext>
             </a:extLst>
           </p:cNvPr>
@@ -6959,7 +6959,7 @@
           <p:cNvPr id="2" name="Title 1">
             <a:extLst>
               <a:ext uri="{FF2B5EF4-FFF2-40B4-BE49-F238E27FC236}">
-                <a16:creationId xmlns:a16="http://schemas.microsoft.com/office/drawing/2014/main" xmlns="" id="{420BF2A0-48D9-4EF2-9C04-1B4037AF0D18}"/>
+                <a16:creationId xmlns="" xmlns:a16="http://schemas.microsoft.com/office/drawing/2014/main" id="{420BF2A0-48D9-4EF2-9C04-1B4037AF0D18}"/>
               </a:ext>
             </a:extLst>
           </p:cNvPr>
@@ -6987,7 +6987,7 @@
           <p:cNvPr id="3" name="Date Placeholder 2">
             <a:extLst>
               <a:ext uri="{FF2B5EF4-FFF2-40B4-BE49-F238E27FC236}">
-                <a16:creationId xmlns:a16="http://schemas.microsoft.com/office/drawing/2014/main" xmlns="" id="{FCBB817F-FF3B-4B26-A8C3-158A768E8699}"/>
+                <a16:creationId xmlns="" xmlns:a16="http://schemas.microsoft.com/office/drawing/2014/main" id="{FCBB817F-FF3B-4B26-A8C3-158A768E8699}"/>
               </a:ext>
             </a:extLst>
           </p:cNvPr>
@@ -7012,7 +7012,7 @@
                 </a:solidFill>
               </a:rPr>
               <a:pPr/>
-              <a:t>5/12/2018</a:t>
+              <a:t>6/9/2018</a:t>
             </a:fld>
             <a:endParaRPr lang="en-US">
               <a:solidFill>
@@ -7029,7 +7029,7 @@
           <p:cNvPr id="4" name="Footer Placeholder 3">
             <a:extLst>
               <a:ext uri="{FF2B5EF4-FFF2-40B4-BE49-F238E27FC236}">
-                <a16:creationId xmlns:a16="http://schemas.microsoft.com/office/drawing/2014/main" xmlns="" id="{438EA37B-39CE-4564-868A-CE8AB0C836B4}"/>
+                <a16:creationId xmlns="" xmlns:a16="http://schemas.microsoft.com/office/drawing/2014/main" id="{438EA37B-39CE-4564-868A-CE8AB0C836B4}"/>
               </a:ext>
             </a:extLst>
           </p:cNvPr>
@@ -7060,7 +7060,7 @@
           <p:cNvPr id="5" name="Slide Number Placeholder 4">
             <a:extLst>
               <a:ext uri="{FF2B5EF4-FFF2-40B4-BE49-F238E27FC236}">
-                <a16:creationId xmlns:a16="http://schemas.microsoft.com/office/drawing/2014/main" xmlns="" id="{B3CAD4AD-C2CA-4D5E-A145-6578479935AC}"/>
+                <a16:creationId xmlns="" xmlns:a16="http://schemas.microsoft.com/office/drawing/2014/main" id="{B3CAD4AD-C2CA-4D5E-A145-6578479935AC}"/>
               </a:ext>
             </a:extLst>
           </p:cNvPr>
@@ -7132,7 +7132,7 @@
           <p:cNvPr id="2" name="Date Placeholder 1">
             <a:extLst>
               <a:ext uri="{FF2B5EF4-FFF2-40B4-BE49-F238E27FC236}">
-                <a16:creationId xmlns:a16="http://schemas.microsoft.com/office/drawing/2014/main" xmlns="" id="{9091E532-214A-47E0-B13C-6653D745177D}"/>
+                <a16:creationId xmlns="" xmlns:a16="http://schemas.microsoft.com/office/drawing/2014/main" id="{9091E532-214A-47E0-B13C-6653D745177D}"/>
               </a:ext>
             </a:extLst>
           </p:cNvPr>
@@ -7157,7 +7157,7 @@
                 </a:solidFill>
               </a:rPr>
               <a:pPr/>
-              <a:t>5/12/2018</a:t>
+              <a:t>6/9/2018</a:t>
             </a:fld>
             <a:endParaRPr lang="en-US">
               <a:solidFill>
@@ -7174,7 +7174,7 @@
           <p:cNvPr id="3" name="Footer Placeholder 2">
             <a:extLst>
               <a:ext uri="{FF2B5EF4-FFF2-40B4-BE49-F238E27FC236}">
-                <a16:creationId xmlns:a16="http://schemas.microsoft.com/office/drawing/2014/main" xmlns="" id="{553F2C72-8663-4F3F-96BB-A900C8566CEA}"/>
+                <a16:creationId xmlns="" xmlns:a16="http://schemas.microsoft.com/office/drawing/2014/main" id="{553F2C72-8663-4F3F-96BB-A900C8566CEA}"/>
               </a:ext>
             </a:extLst>
           </p:cNvPr>
@@ -7205,7 +7205,7 @@
           <p:cNvPr id="4" name="Slide Number Placeholder 3">
             <a:extLst>
               <a:ext uri="{FF2B5EF4-FFF2-40B4-BE49-F238E27FC236}">
-                <a16:creationId xmlns:a16="http://schemas.microsoft.com/office/drawing/2014/main" xmlns="" id="{BFE1B87F-CB3B-4360-8C2F-D500E8D878F8}"/>
+                <a16:creationId xmlns="" xmlns:a16="http://schemas.microsoft.com/office/drawing/2014/main" id="{BFE1B87F-CB3B-4360-8C2F-D500E8D878F8}"/>
               </a:ext>
             </a:extLst>
           </p:cNvPr>
@@ -7277,7 +7277,7 @@
           <p:cNvPr id="2" name="Title 1">
             <a:extLst>
               <a:ext uri="{FF2B5EF4-FFF2-40B4-BE49-F238E27FC236}">
-                <a16:creationId xmlns:a16="http://schemas.microsoft.com/office/drawing/2014/main" xmlns="" id="{7B28FB69-496E-4279-A561-83FCAF6DF9B6}"/>
+                <a16:creationId xmlns="" xmlns:a16="http://schemas.microsoft.com/office/drawing/2014/main" id="{7B28FB69-496E-4279-A561-83FCAF6DF9B6}"/>
               </a:ext>
             </a:extLst>
           </p:cNvPr>
@@ -7314,7 +7314,7 @@
           <p:cNvPr id="3" name="Content Placeholder 2">
             <a:extLst>
               <a:ext uri="{FF2B5EF4-FFF2-40B4-BE49-F238E27FC236}">
-                <a16:creationId xmlns:a16="http://schemas.microsoft.com/office/drawing/2014/main" xmlns="" id="{EC18CE18-0BD3-4356-A713-0D6204ADE0E2}"/>
+                <a16:creationId xmlns="" xmlns:a16="http://schemas.microsoft.com/office/drawing/2014/main" id="{EC18CE18-0BD3-4356-A713-0D6204ADE0E2}"/>
               </a:ext>
             </a:extLst>
           </p:cNvPr>
@@ -7404,7 +7404,7 @@
           <p:cNvPr id="4" name="Text Placeholder 3">
             <a:extLst>
               <a:ext uri="{FF2B5EF4-FFF2-40B4-BE49-F238E27FC236}">
-                <a16:creationId xmlns:a16="http://schemas.microsoft.com/office/drawing/2014/main" xmlns="" id="{69693322-A8E5-4E82-84A0-987109E4606F}"/>
+                <a16:creationId xmlns="" xmlns:a16="http://schemas.microsoft.com/office/drawing/2014/main" id="{69693322-A8E5-4E82-84A0-987109E4606F}"/>
               </a:ext>
             </a:extLst>
           </p:cNvPr>
@@ -7475,7 +7475,7 @@
           <p:cNvPr id="5" name="Date Placeholder 4">
             <a:extLst>
               <a:ext uri="{FF2B5EF4-FFF2-40B4-BE49-F238E27FC236}">
-                <a16:creationId xmlns:a16="http://schemas.microsoft.com/office/drawing/2014/main" xmlns="" id="{DE8BEB52-BEAB-4AA1-883E-7A1FD1FF2D67}"/>
+                <a16:creationId xmlns="" xmlns:a16="http://schemas.microsoft.com/office/drawing/2014/main" id="{DE8BEB52-BEAB-4AA1-883E-7A1FD1FF2D67}"/>
               </a:ext>
             </a:extLst>
           </p:cNvPr>
@@ -7500,7 +7500,7 @@
                 </a:solidFill>
               </a:rPr>
               <a:pPr/>
-              <a:t>5/12/2018</a:t>
+              <a:t>6/9/2018</a:t>
             </a:fld>
             <a:endParaRPr lang="en-US">
               <a:solidFill>
@@ -7517,7 +7517,7 @@
           <p:cNvPr id="6" name="Footer Placeholder 5">
             <a:extLst>
               <a:ext uri="{FF2B5EF4-FFF2-40B4-BE49-F238E27FC236}">
-                <a16:creationId xmlns:a16="http://schemas.microsoft.com/office/drawing/2014/main" xmlns="" id="{1EBED89E-D77C-442B-86BE-6C1B8B51B992}"/>
+                <a16:creationId xmlns="" xmlns:a16="http://schemas.microsoft.com/office/drawing/2014/main" id="{1EBED89E-D77C-442B-86BE-6C1B8B51B992}"/>
               </a:ext>
             </a:extLst>
           </p:cNvPr>
@@ -7548,7 +7548,7 @@
           <p:cNvPr id="7" name="Slide Number Placeholder 6">
             <a:extLst>
               <a:ext uri="{FF2B5EF4-FFF2-40B4-BE49-F238E27FC236}">
-                <a16:creationId xmlns:a16="http://schemas.microsoft.com/office/drawing/2014/main" xmlns="" id="{FDEBFCD2-06DE-4984-ABAC-956E953C4593}"/>
+                <a16:creationId xmlns="" xmlns:a16="http://schemas.microsoft.com/office/drawing/2014/main" id="{FDEBFCD2-06DE-4984-ABAC-956E953C4593}"/>
               </a:ext>
             </a:extLst>
           </p:cNvPr>
@@ -7827,7 +7827,7 @@
           <p:cNvPr id="2" name="Title 1">
             <a:extLst>
               <a:ext uri="{FF2B5EF4-FFF2-40B4-BE49-F238E27FC236}">
-                <a16:creationId xmlns:a16="http://schemas.microsoft.com/office/drawing/2014/main" xmlns="" id="{BE586F2C-9F78-4ECF-B112-6A168592E85C}"/>
+                <a16:creationId xmlns="" xmlns:a16="http://schemas.microsoft.com/office/drawing/2014/main" id="{BE586F2C-9F78-4ECF-B112-6A168592E85C}"/>
               </a:ext>
             </a:extLst>
           </p:cNvPr>
@@ -7864,7 +7864,7 @@
           <p:cNvPr id="3" name="Picture Placeholder 2">
             <a:extLst>
               <a:ext uri="{FF2B5EF4-FFF2-40B4-BE49-F238E27FC236}">
-                <a16:creationId xmlns:a16="http://schemas.microsoft.com/office/drawing/2014/main" xmlns="" id="{38DC6266-57C4-4896-9BA4-691D3CD5640D}"/>
+                <a16:creationId xmlns="" xmlns:a16="http://schemas.microsoft.com/office/drawing/2014/main" id="{38DC6266-57C4-4896-9BA4-691D3CD5640D}"/>
               </a:ext>
             </a:extLst>
           </p:cNvPr>
@@ -7931,7 +7931,7 @@
           <p:cNvPr id="4" name="Text Placeholder 3">
             <a:extLst>
               <a:ext uri="{FF2B5EF4-FFF2-40B4-BE49-F238E27FC236}">
-                <a16:creationId xmlns:a16="http://schemas.microsoft.com/office/drawing/2014/main" xmlns="" id="{69306F70-AB6F-48ED-A8CC-0373F248463E}"/>
+                <a16:creationId xmlns="" xmlns:a16="http://schemas.microsoft.com/office/drawing/2014/main" id="{69306F70-AB6F-48ED-A8CC-0373F248463E}"/>
               </a:ext>
             </a:extLst>
           </p:cNvPr>
@@ -8002,7 +8002,7 @@
           <p:cNvPr id="5" name="Date Placeholder 4">
             <a:extLst>
               <a:ext uri="{FF2B5EF4-FFF2-40B4-BE49-F238E27FC236}">
-                <a16:creationId xmlns:a16="http://schemas.microsoft.com/office/drawing/2014/main" xmlns="" id="{D67A27DB-82BB-47D4-80DB-14F8B550122B}"/>
+                <a16:creationId xmlns="" xmlns:a16="http://schemas.microsoft.com/office/drawing/2014/main" id="{D67A27DB-82BB-47D4-80DB-14F8B550122B}"/>
               </a:ext>
             </a:extLst>
           </p:cNvPr>
@@ -8027,7 +8027,7 @@
                 </a:solidFill>
               </a:rPr>
               <a:pPr/>
-              <a:t>5/12/2018</a:t>
+              <a:t>6/9/2018</a:t>
             </a:fld>
             <a:endParaRPr lang="en-US">
               <a:solidFill>
@@ -8044,7 +8044,7 @@
           <p:cNvPr id="6" name="Footer Placeholder 5">
             <a:extLst>
               <a:ext uri="{FF2B5EF4-FFF2-40B4-BE49-F238E27FC236}">
-                <a16:creationId xmlns:a16="http://schemas.microsoft.com/office/drawing/2014/main" xmlns="" id="{9FA6A842-B16A-44EC-AFAC-DDBB4510A9DD}"/>
+                <a16:creationId xmlns="" xmlns:a16="http://schemas.microsoft.com/office/drawing/2014/main" id="{9FA6A842-B16A-44EC-AFAC-DDBB4510A9DD}"/>
               </a:ext>
             </a:extLst>
           </p:cNvPr>
@@ -8075,7 +8075,7 @@
           <p:cNvPr id="7" name="Slide Number Placeholder 6">
             <a:extLst>
               <a:ext uri="{FF2B5EF4-FFF2-40B4-BE49-F238E27FC236}">
-                <a16:creationId xmlns:a16="http://schemas.microsoft.com/office/drawing/2014/main" xmlns="" id="{B383199F-DD9F-44E2-9973-2F79C0CC036D}"/>
+                <a16:creationId xmlns="" xmlns:a16="http://schemas.microsoft.com/office/drawing/2014/main" id="{B383199F-DD9F-44E2-9973-2F79C0CC036D}"/>
               </a:ext>
             </a:extLst>
           </p:cNvPr>
@@ -8147,7 +8147,7 @@
           <p:cNvPr id="2" name="Title 1">
             <a:extLst>
               <a:ext uri="{FF2B5EF4-FFF2-40B4-BE49-F238E27FC236}">
-                <a16:creationId xmlns:a16="http://schemas.microsoft.com/office/drawing/2014/main" xmlns="" id="{D085C8B3-BE8E-408B-AD92-4B281F3269BE}"/>
+                <a16:creationId xmlns="" xmlns:a16="http://schemas.microsoft.com/office/drawing/2014/main" id="{D085C8B3-BE8E-408B-AD92-4B281F3269BE}"/>
               </a:ext>
             </a:extLst>
           </p:cNvPr>
@@ -8175,7 +8175,7 @@
           <p:cNvPr id="3" name="Vertical Text Placeholder 2">
             <a:extLst>
               <a:ext uri="{FF2B5EF4-FFF2-40B4-BE49-F238E27FC236}">
-                <a16:creationId xmlns:a16="http://schemas.microsoft.com/office/drawing/2014/main" xmlns="" id="{ED8B740D-DE97-432A-92E7-2F3E9BFBE006}"/>
+                <a16:creationId xmlns="" xmlns:a16="http://schemas.microsoft.com/office/drawing/2014/main" id="{ED8B740D-DE97-432A-92E7-2F3E9BFBE006}"/>
               </a:ext>
             </a:extLst>
           </p:cNvPr>
@@ -8232,7 +8232,7 @@
           <p:cNvPr id="4" name="Date Placeholder 3">
             <a:extLst>
               <a:ext uri="{FF2B5EF4-FFF2-40B4-BE49-F238E27FC236}">
-                <a16:creationId xmlns:a16="http://schemas.microsoft.com/office/drawing/2014/main" xmlns="" id="{0128F100-7C1C-400F-8A25-7BCCC77BB702}"/>
+                <a16:creationId xmlns="" xmlns:a16="http://schemas.microsoft.com/office/drawing/2014/main" id="{0128F100-7C1C-400F-8A25-7BCCC77BB702}"/>
               </a:ext>
             </a:extLst>
           </p:cNvPr>
@@ -8257,7 +8257,7 @@
                 </a:solidFill>
               </a:rPr>
               <a:pPr/>
-              <a:t>5/12/2018</a:t>
+              <a:t>6/9/2018</a:t>
             </a:fld>
             <a:endParaRPr lang="en-US">
               <a:solidFill>
@@ -8274,7 +8274,7 @@
           <p:cNvPr id="5" name="Footer Placeholder 4">
             <a:extLst>
               <a:ext uri="{FF2B5EF4-FFF2-40B4-BE49-F238E27FC236}">
-                <a16:creationId xmlns:a16="http://schemas.microsoft.com/office/drawing/2014/main" xmlns="" id="{6C3DC0D8-FFCE-46C5-B59E-120324D0841C}"/>
+                <a16:creationId xmlns="" xmlns:a16="http://schemas.microsoft.com/office/drawing/2014/main" id="{6C3DC0D8-FFCE-46C5-B59E-120324D0841C}"/>
               </a:ext>
             </a:extLst>
           </p:cNvPr>
@@ -8305,7 +8305,7 @@
           <p:cNvPr id="6" name="Slide Number Placeholder 5">
             <a:extLst>
               <a:ext uri="{FF2B5EF4-FFF2-40B4-BE49-F238E27FC236}">
-                <a16:creationId xmlns:a16="http://schemas.microsoft.com/office/drawing/2014/main" xmlns="" id="{F7C4D54C-A863-4DE2-99B0-68569760ABBC}"/>
+                <a16:creationId xmlns="" xmlns:a16="http://schemas.microsoft.com/office/drawing/2014/main" id="{F7C4D54C-A863-4DE2-99B0-68569760ABBC}"/>
               </a:ext>
             </a:extLst>
           </p:cNvPr>
@@ -8377,7 +8377,7 @@
           <p:cNvPr id="2" name="Vertical Title 1">
             <a:extLst>
               <a:ext uri="{FF2B5EF4-FFF2-40B4-BE49-F238E27FC236}">
-                <a16:creationId xmlns:a16="http://schemas.microsoft.com/office/drawing/2014/main" xmlns="" id="{87EB6F95-1910-4D31-B199-A7CA6867C4E2}"/>
+                <a16:creationId xmlns="" xmlns:a16="http://schemas.microsoft.com/office/drawing/2014/main" id="{87EB6F95-1910-4D31-B199-A7CA6867C4E2}"/>
               </a:ext>
             </a:extLst>
           </p:cNvPr>
@@ -8410,7 +8410,7 @@
           <p:cNvPr id="3" name="Vertical Text Placeholder 2">
             <a:extLst>
               <a:ext uri="{FF2B5EF4-FFF2-40B4-BE49-F238E27FC236}">
-                <a16:creationId xmlns:a16="http://schemas.microsoft.com/office/drawing/2014/main" xmlns="" id="{551CA810-8C18-4A43-9B25-FD6204BD5E49}"/>
+                <a16:creationId xmlns="" xmlns:a16="http://schemas.microsoft.com/office/drawing/2014/main" id="{551CA810-8C18-4A43-9B25-FD6204BD5E49}"/>
               </a:ext>
             </a:extLst>
           </p:cNvPr>
@@ -8472,7 +8472,7 @@
           <p:cNvPr id="4" name="Date Placeholder 3">
             <a:extLst>
               <a:ext uri="{FF2B5EF4-FFF2-40B4-BE49-F238E27FC236}">
-                <a16:creationId xmlns:a16="http://schemas.microsoft.com/office/drawing/2014/main" xmlns="" id="{07D06A96-E152-4625-A3C1-470FA2F40354}"/>
+                <a16:creationId xmlns="" xmlns:a16="http://schemas.microsoft.com/office/drawing/2014/main" id="{07D06A96-E152-4625-A3C1-470FA2F40354}"/>
               </a:ext>
             </a:extLst>
           </p:cNvPr>
@@ -8497,7 +8497,7 @@
                 </a:solidFill>
               </a:rPr>
               <a:pPr/>
-              <a:t>5/12/2018</a:t>
+              <a:t>6/9/2018</a:t>
             </a:fld>
             <a:endParaRPr lang="en-US">
               <a:solidFill>
@@ -8514,7 +8514,7 @@
           <p:cNvPr id="5" name="Footer Placeholder 4">
             <a:extLst>
               <a:ext uri="{FF2B5EF4-FFF2-40B4-BE49-F238E27FC236}">
-                <a16:creationId xmlns:a16="http://schemas.microsoft.com/office/drawing/2014/main" xmlns="" id="{1B6781E3-2A4F-4B43-825C-5DCEC610E584}"/>
+                <a16:creationId xmlns="" xmlns:a16="http://schemas.microsoft.com/office/drawing/2014/main" id="{1B6781E3-2A4F-4B43-825C-5DCEC610E584}"/>
               </a:ext>
             </a:extLst>
           </p:cNvPr>
@@ -8545,7 +8545,7 @@
           <p:cNvPr id="6" name="Slide Number Placeholder 5">
             <a:extLst>
               <a:ext uri="{FF2B5EF4-FFF2-40B4-BE49-F238E27FC236}">
-                <a16:creationId xmlns:a16="http://schemas.microsoft.com/office/drawing/2014/main" xmlns="" id="{3969F29D-98D7-46D3-967F-30E8A931291A}"/>
+                <a16:creationId xmlns="" xmlns:a16="http://schemas.microsoft.com/office/drawing/2014/main" id="{3969F29D-98D7-46D3-967F-30E8A931291A}"/>
               </a:ext>
             </a:extLst>
           </p:cNvPr>
@@ -10867,7 +10867,7 @@
           <p:cNvPr id="2" name="Title Placeholder 1">
             <a:extLst>
               <a:ext uri="{FF2B5EF4-FFF2-40B4-BE49-F238E27FC236}">
-                <a16:creationId xmlns:a16="http://schemas.microsoft.com/office/drawing/2014/main" xmlns="" id="{8CFA6C82-CCEB-43EF-8065-A5C4A8F5CB98}"/>
+                <a16:creationId xmlns="" xmlns:a16="http://schemas.microsoft.com/office/drawing/2014/main" id="{8CFA6C82-CCEB-43EF-8065-A5C4A8F5CB98}"/>
               </a:ext>
             </a:extLst>
           </p:cNvPr>
@@ -10905,7 +10905,7 @@
           <p:cNvPr id="3" name="Text Placeholder 2">
             <a:extLst>
               <a:ext uri="{FF2B5EF4-FFF2-40B4-BE49-F238E27FC236}">
-                <a16:creationId xmlns:a16="http://schemas.microsoft.com/office/drawing/2014/main" xmlns="" id="{8B688409-879D-4F0A-98F7-117BE95A570E}"/>
+                <a16:creationId xmlns="" xmlns:a16="http://schemas.microsoft.com/office/drawing/2014/main" id="{8B688409-879D-4F0A-98F7-117BE95A570E}"/>
               </a:ext>
             </a:extLst>
           </p:cNvPr>
@@ -10972,7 +10972,7 @@
           <p:cNvPr id="4" name="Date Placeholder 3">
             <a:extLst>
               <a:ext uri="{FF2B5EF4-FFF2-40B4-BE49-F238E27FC236}">
-                <a16:creationId xmlns:a16="http://schemas.microsoft.com/office/drawing/2014/main" xmlns="" id="{D09A5908-42BD-4A07-8598-89E7E37B5825}"/>
+                <a16:creationId xmlns="" xmlns:a16="http://schemas.microsoft.com/office/drawing/2014/main" id="{D09A5908-42BD-4A07-8598-89E7E37B5825}"/>
               </a:ext>
             </a:extLst>
           </p:cNvPr>
@@ -11016,7 +11016,7 @@
                 </a:solidFill>
               </a:rPr>
               <a:pPr defTabSz="685800"/>
-              <a:t>5/12/2018</a:t>
+              <a:t>6/9/2018</a:t>
             </a:fld>
             <a:endParaRPr lang="en-US">
               <a:solidFill>
@@ -11033,7 +11033,7 @@
           <p:cNvPr id="5" name="Footer Placeholder 4">
             <a:extLst>
               <a:ext uri="{FF2B5EF4-FFF2-40B4-BE49-F238E27FC236}">
-                <a16:creationId xmlns:a16="http://schemas.microsoft.com/office/drawing/2014/main" xmlns="" id="{9FEDDDF3-FFBF-4536-A24D-68FDF2D06480}"/>
+                <a16:creationId xmlns="" xmlns:a16="http://schemas.microsoft.com/office/drawing/2014/main" id="{9FEDDDF3-FFBF-4536-A24D-68FDF2D06480}"/>
               </a:ext>
             </a:extLst>
           </p:cNvPr>
@@ -11083,7 +11083,7 @@
           <p:cNvPr id="6" name="Slide Number Placeholder 5">
             <a:extLst>
               <a:ext uri="{FF2B5EF4-FFF2-40B4-BE49-F238E27FC236}">
-                <a16:creationId xmlns:a16="http://schemas.microsoft.com/office/drawing/2014/main" xmlns="" id="{6FCEF61F-FCF2-420B-BA91-F320DFADE850}"/>
+                <a16:creationId xmlns="" xmlns:a16="http://schemas.microsoft.com/office/drawing/2014/main" id="{6FCEF61F-FCF2-420B-BA91-F320DFADE850}"/>
               </a:ext>
             </a:extLst>
           </p:cNvPr>
@@ -12524,21 +12524,7 @@
                 <a:ea typeface="Calibri"/>
                 <a:cs typeface="Times New Roman"/>
               </a:rPr>
-              <a:t> </a:t>
-            </a:r>
-            <a:r>
-              <a:rPr lang="en-US" sz="1700" b="1" dirty="0">
-                <a:solidFill>
-                  <a:srgbClr val="000080"/>
-                </a:solidFill>
-                <a:highlight>
-                  <a:srgbClr val="FFFFFF"/>
-                </a:highlight>
-                <a:latin typeface="Courier New"/>
-                <a:ea typeface="Calibri"/>
-                <a:cs typeface="Times New Roman"/>
-              </a:rPr>
-              <a:t>* </a:t>
+              <a:t> * </a:t>
             </a:r>
             <a:r>
               <a:rPr lang="en-US" sz="1700" b="1" dirty="0">
@@ -12704,12 +12690,12 @@
                 <a:ea typeface="Calibri"/>
                 <a:cs typeface="Times New Roman"/>
               </a:rPr>
-              <a:t> </a:t>
+              <a:t> * </a:t>
             </a:r>
             <a:r>
               <a:rPr lang="en-US" sz="1700" b="1" dirty="0">
                 <a:solidFill>
-                  <a:srgbClr val="000080"/>
+                  <a:srgbClr val="008080"/>
                 </a:solidFill>
                 <a:highlight>
                   <a:srgbClr val="FFFFFF"/>
@@ -12718,12 +12704,12 @@
                 <a:ea typeface="Calibri"/>
                 <a:cs typeface="Times New Roman"/>
               </a:rPr>
-              <a:t>* </a:t>
+              <a:t>from</a:t>
             </a:r>
             <a:r>
               <a:rPr lang="en-US" sz="1700" b="1" dirty="0">
                 <a:solidFill>
-                  <a:srgbClr val="008080"/>
+                  <a:srgbClr val="000080"/>
                 </a:solidFill>
                 <a:highlight>
                   <a:srgbClr val="FFFFFF"/>
@@ -12732,12 +12718,12 @@
                 <a:ea typeface="Calibri"/>
                 <a:cs typeface="Times New Roman"/>
               </a:rPr>
-              <a:t>from</a:t>
+              <a:t> </a:t>
             </a:r>
             <a:r>
               <a:rPr lang="en-US" sz="1700" b="1" dirty="0">
                 <a:solidFill>
-                  <a:srgbClr val="000080"/>
+                  <a:srgbClr val="008080"/>
                 </a:solidFill>
                 <a:highlight>
                   <a:srgbClr val="FFFFFF"/>
@@ -12746,12 +12732,12 @@
                 <a:ea typeface="Calibri"/>
                 <a:cs typeface="Times New Roman"/>
               </a:rPr>
-              <a:t> </a:t>
+              <a:t>table</a:t>
             </a:r>
             <a:r>
               <a:rPr lang="en-US" sz="1700" b="1" dirty="0">
                 <a:solidFill>
-                  <a:srgbClr val="008080"/>
+                  <a:srgbClr val="000080"/>
                 </a:solidFill>
                 <a:highlight>
                   <a:srgbClr val="FFFFFF"/>
@@ -12760,12 +12746,12 @@
                 <a:ea typeface="Calibri"/>
                 <a:cs typeface="Times New Roman"/>
               </a:rPr>
-              <a:t>table</a:t>
+              <a:t>(m5(</a:t>
             </a:r>
             <a:r>
               <a:rPr lang="en-US" sz="1700" b="1" dirty="0">
                 <a:solidFill>
-                  <a:srgbClr val="000080"/>
+                  <a:srgbClr val="0000FF"/>
                 </a:solidFill>
                 <a:highlight>
                   <a:srgbClr val="FFFFFF"/>
@@ -12774,10 +12760,10 @@
                 <a:ea typeface="Calibri"/>
                 <a:cs typeface="Times New Roman"/>
               </a:rPr>
-              <a:t>(m5(</a:t>
-            </a:r>
-            <a:r>
-              <a:rPr lang="en-US" sz="1700" b="1" dirty="0">
+              <a:t>'#!/bin/</a:t>
+            </a:r>
+            <a:r>
+              <a:rPr lang="en-US" sz="1700" b="1" dirty="0" err="1">
                 <a:solidFill>
                   <a:srgbClr val="0000FF"/>
                 </a:solidFill>
@@ -12788,10 +12774,10 @@
                 <a:ea typeface="Calibri"/>
                 <a:cs typeface="Times New Roman"/>
               </a:rPr>
-              <a:t>'#!/bin/</a:t>
-            </a:r>
-            <a:r>
-              <a:rPr lang="en-US" sz="1700" b="1" dirty="0" err="1">
+              <a:t>ksh</a:t>
+            </a:r>
+            <a:r>
+              <a:rPr lang="en-US" sz="1700" b="1" dirty="0">
                 <a:solidFill>
                   <a:srgbClr val="0000FF"/>
                 </a:solidFill>
@@ -12802,9 +12788,9 @@
                 <a:ea typeface="Calibri"/>
                 <a:cs typeface="Times New Roman"/>
               </a:rPr>
-              <a:t>ksh</a:t>
-            </a:r>
-            <a:r>
+              <a:t/>
+            </a:r>
+            <a:br>
               <a:rPr lang="en-US" sz="1700" b="1" dirty="0">
                 <a:solidFill>
                   <a:srgbClr val="0000FF"/>
@@ -12816,9 +12802,8 @@
                 <a:ea typeface="Calibri"/>
                 <a:cs typeface="Times New Roman"/>
               </a:rPr>
-              <a:t/>
-            </a:r>
-            <a:br>
+            </a:br>
+            <a:r>
               <a:rPr lang="en-US" sz="1700" b="1" dirty="0">
                 <a:solidFill>
                   <a:srgbClr val="0000FF"/>
@@ -12830,9 +12815,10 @@
                 <a:ea typeface="Calibri"/>
                 <a:cs typeface="Times New Roman"/>
               </a:rPr>
-            </a:br>
-            <a:r>
-              <a:rPr lang="en-US" sz="1700" b="1" dirty="0">
+              <a:t>    </a:t>
+            </a:r>
+            <a:r>
+              <a:rPr lang="en-US" sz="1700" b="1" dirty="0" err="1">
                 <a:solidFill>
                   <a:srgbClr val="0000FF"/>
                 </a:solidFill>
@@ -12843,7 +12829,7 @@
                 <a:ea typeface="Calibri"/>
                 <a:cs typeface="Times New Roman"/>
               </a:rPr>
-              <a:t>  </a:t>
+              <a:t>df</a:t>
             </a:r>
             <a:r>
               <a:rPr lang="en-US" sz="1700" b="1" dirty="0">
@@ -12857,49 +12843,7 @@
                 <a:ea typeface="Calibri"/>
                 <a:cs typeface="Times New Roman"/>
               </a:rPr>
-              <a:t>  </a:t>
-            </a:r>
-            <a:r>
-              <a:rPr lang="en-US" sz="1700" b="1" dirty="0" err="1">
-                <a:solidFill>
-                  <a:srgbClr val="0000FF"/>
-                </a:solidFill>
-                <a:highlight>
-                  <a:srgbClr val="FFFFFF"/>
-                </a:highlight>
-                <a:latin typeface="Courier New"/>
-                <a:ea typeface="Calibri"/>
-                <a:cs typeface="Times New Roman"/>
-              </a:rPr>
-              <a:t>df</a:t>
-            </a:r>
-            <a:r>
-              <a:rPr lang="en-US" sz="1700" b="1" dirty="0">
-                <a:solidFill>
-                  <a:srgbClr val="0000FF"/>
-                </a:solidFill>
-                <a:highlight>
-                  <a:srgbClr val="FFFFFF"/>
-                </a:highlight>
-                <a:latin typeface="Courier New"/>
-                <a:ea typeface="Calibri"/>
-                <a:cs typeface="Times New Roman"/>
-              </a:rPr>
-              <a:t> </a:t>
-            </a:r>
-            <a:r>
-              <a:rPr lang="en-US" sz="1700" b="1" dirty="0">
-                <a:solidFill>
-                  <a:srgbClr val="0000FF"/>
-                </a:solidFill>
-                <a:highlight>
-                  <a:srgbClr val="FFFFFF"/>
-                </a:highlight>
-                <a:latin typeface="Courier New"/>
-                <a:ea typeface="Calibri"/>
-                <a:cs typeface="Times New Roman"/>
-              </a:rPr>
-              <a:t>-</a:t>
+              <a:t> -</a:t>
             </a:r>
             <a:r>
               <a:rPr lang="en-US" sz="1700" b="1" dirty="0" err="1">
@@ -13079,20 +13023,7 @@
                 <a:latin typeface="Courier New"/>
                 <a:ea typeface="Calibri"/>
               </a:rPr>
-              <a:t> </a:t>
-            </a:r>
-            <a:r>
-              <a:rPr lang="en-US" sz="1700" b="1" dirty="0">
-                <a:solidFill>
-                  <a:srgbClr val="000080"/>
-                </a:solidFill>
-                <a:highlight>
-                  <a:srgbClr val="FFFFFF"/>
-                </a:highlight>
-                <a:latin typeface="Courier New"/>
-                <a:ea typeface="Calibri"/>
-              </a:rPr>
-              <a:t>* </a:t>
+              <a:t> * </a:t>
             </a:r>
             <a:r>
               <a:rPr lang="en-US" sz="1700" b="1" dirty="0">
@@ -13231,21 +13162,7 @@
                 <a:ea typeface="Calibri"/>
                 <a:cs typeface="Times New Roman"/>
               </a:rPr>
-              <a:t> </a:t>
-            </a:r>
-            <a:r>
-              <a:rPr lang="en-US" sz="1700" b="1" dirty="0">
-                <a:solidFill>
-                  <a:srgbClr val="000080"/>
-                </a:solidFill>
-                <a:highlight>
-                  <a:srgbClr val="FFFFFF"/>
-                </a:highlight>
-                <a:latin typeface="Courier New"/>
-                <a:ea typeface="Calibri"/>
-                <a:cs typeface="Times New Roman"/>
-              </a:rPr>
-              <a:t>* </a:t>
+              <a:t> * </a:t>
             </a:r>
             <a:r>
               <a:rPr lang="en-US" sz="1700" b="1" dirty="0">
@@ -13458,35 +13375,7 @@
                 <a:ea typeface="Calibri"/>
                 <a:cs typeface="Times New Roman"/>
               </a:rPr>
-              <a:t> </a:t>
-            </a:r>
-            <a:r>
-              <a:rPr lang="en-US" sz="1700" b="1" dirty="0">
-                <a:solidFill>
-                  <a:srgbClr val="000080"/>
-                </a:solidFill>
-                <a:highlight>
-                  <a:srgbClr val="FFFFFF"/>
-                </a:highlight>
-                <a:latin typeface="Courier New"/>
-                <a:ea typeface="Calibri"/>
-                <a:cs typeface="Times New Roman"/>
-              </a:rPr>
-              <a:t>    m5_proc</a:t>
-            </a:r>
-            <a:r>
-              <a:rPr lang="en-US" sz="1700" b="1" dirty="0">
-                <a:solidFill>
-                  <a:srgbClr val="000080"/>
-                </a:solidFill>
-                <a:highlight>
-                  <a:srgbClr val="FFFFFF"/>
-                </a:highlight>
-                <a:latin typeface="Courier New"/>
-                <a:ea typeface="Calibri"/>
-                <a:cs typeface="Times New Roman"/>
-              </a:rPr>
-              <a:t>(</a:t>
+              <a:t>     m5_proc(</a:t>
             </a:r>
             <a:r>
               <a:rPr lang="en-US" sz="1700" b="1" dirty="0">
@@ -13685,21 +13574,7 @@
                 <a:ea typeface="Calibri"/>
                 <a:cs typeface="Times New Roman"/>
               </a:rPr>
-              <a:t> </a:t>
-            </a:r>
-            <a:r>
-              <a:rPr lang="en-US" sz="1700" b="1" dirty="0">
-                <a:solidFill>
-                  <a:srgbClr val="000080"/>
-                </a:solidFill>
-                <a:highlight>
-                  <a:srgbClr val="FFFFFF"/>
-                </a:highlight>
-                <a:latin typeface="Courier New"/>
-                <a:ea typeface="Calibri"/>
-                <a:cs typeface="Times New Roman"/>
-              </a:rPr>
-              <a:t>* </a:t>
+              <a:t> * </a:t>
             </a:r>
             <a:r>
               <a:rPr lang="en-US" sz="1700" b="1" dirty="0">
@@ -13770,21 +13645,7 @@
                 <a:ea typeface="Calibri"/>
                 <a:cs typeface="Times New Roman"/>
               </a:rPr>
-              <a:t> </a:t>
-            </a:r>
-            <a:r>
-              <a:rPr lang="en-US" sz="1700" b="1" dirty="0">
-                <a:solidFill>
-                  <a:srgbClr val="000080"/>
-                </a:solidFill>
-                <a:highlight>
-                  <a:srgbClr val="FFFFFF"/>
-                </a:highlight>
-                <a:latin typeface="Courier New"/>
-                <a:ea typeface="Calibri"/>
-                <a:cs typeface="Times New Roman"/>
-              </a:rPr>
-              <a:t>* </a:t>
+              <a:t> * </a:t>
             </a:r>
             <a:r>
               <a:rPr lang="en-US" sz="1700" b="1" dirty="0">
@@ -13855,12 +13716,12 @@
                 <a:ea typeface="Calibri"/>
                 <a:cs typeface="Times New Roman"/>
               </a:rPr>
-              <a:t> </a:t>
+              <a:t> * </a:t>
             </a:r>
             <a:r>
               <a:rPr lang="en-US" sz="1700" b="1" dirty="0">
                 <a:solidFill>
-                  <a:srgbClr val="000080"/>
+                  <a:srgbClr val="008080"/>
                 </a:solidFill>
                 <a:highlight>
                   <a:srgbClr val="FFFFFF"/>
@@ -13869,12 +13730,12 @@
                 <a:ea typeface="Calibri"/>
                 <a:cs typeface="Times New Roman"/>
               </a:rPr>
-              <a:t>* </a:t>
+              <a:t>from</a:t>
             </a:r>
             <a:r>
               <a:rPr lang="en-US" sz="1700" b="1" dirty="0">
                 <a:solidFill>
-                  <a:srgbClr val="008080"/>
+                  <a:srgbClr val="000080"/>
                 </a:solidFill>
                 <a:highlight>
                   <a:srgbClr val="FFFFFF"/>
@@ -13883,35 +13744,7 @@
                 <a:ea typeface="Calibri"/>
                 <a:cs typeface="Times New Roman"/>
               </a:rPr>
-              <a:t>from</a:t>
-            </a:r>
-            <a:r>
-              <a:rPr lang="en-US" sz="1700" b="1" dirty="0">
-                <a:solidFill>
-                  <a:srgbClr val="000080"/>
-                </a:solidFill>
-                <a:highlight>
-                  <a:srgbClr val="FFFFFF"/>
-                </a:highlight>
-                <a:latin typeface="Courier New"/>
-                <a:ea typeface="Calibri"/>
-                <a:cs typeface="Times New Roman"/>
-              </a:rPr>
-              <a:t> m5_errors</a:t>
-            </a:r>
-            <a:r>
-              <a:rPr lang="en-US" sz="1700" b="1" dirty="0">
-                <a:solidFill>
-                  <a:srgbClr val="000080"/>
-                </a:solidFill>
-                <a:highlight>
-                  <a:srgbClr val="FFFFFF"/>
-                </a:highlight>
-                <a:latin typeface="Courier New"/>
-                <a:ea typeface="Calibri"/>
-                <a:cs typeface="Times New Roman"/>
-              </a:rPr>
-              <a:t>;</a:t>
+              <a:t> m5_errors;</a:t>
             </a:r>
             <a:endParaRPr lang="en-US" sz="1700" b="1" dirty="0">
               <a:ea typeface="Calibri"/>
@@ -16678,19 +16511,7 @@
                 </a:highlight>
                 <a:latin typeface="Lucida Console" panose="020B0609040504020204" pitchFamily="49" charset="0"/>
               </a:rPr>
-              <a:t>m5_proc</a:t>
-            </a:r>
-            <a:r>
-              <a:rPr lang="en-US" sz="2000" b="1" dirty="0">
-                <a:solidFill>
-                  <a:srgbClr val="000080"/>
-                </a:solidFill>
-                <a:highlight>
-                  <a:srgbClr val="FFFFFF"/>
-                </a:highlight>
-                <a:latin typeface="Lucida Console" panose="020B0609040504020204" pitchFamily="49" charset="0"/>
-              </a:rPr>
-              <a:t>(</a:t>
+              <a:t>m5_proc(</a:t>
             </a:r>
             <a:r>
               <a:rPr lang="en-US" sz="2000" b="1" dirty="0">
@@ -16886,22 +16707,22 @@
                 </a:highlight>
                 <a:latin typeface="Lucida Console" panose="020B0609040504020204" pitchFamily="49" charset="0"/>
               </a:rPr>
-              <a:t>m5_proc</a:t>
+              <a:t>m5_proc(</a:t>
             </a:r>
             <a:r>
               <a:rPr lang="en-US" sz="2000" b="1" dirty="0">
                 <a:solidFill>
-                  <a:srgbClr val="000080"/>
+                  <a:srgbClr val="0000FF"/>
                 </a:solidFill>
                 <a:highlight>
                   <a:srgbClr val="FFFFFF"/>
                 </a:highlight>
                 <a:latin typeface="Lucida Console" panose="020B0609040504020204" pitchFamily="49" charset="0"/>
               </a:rPr>
-              <a:t>(</a:t>
-            </a:r>
-            <a:r>
-              <a:rPr lang="en-US" sz="2000" b="1" dirty="0">
+              <a:t>'#!/bin/</a:t>
+            </a:r>
+            <a:r>
+              <a:rPr lang="en-US" sz="2000" b="1" dirty="0" err="1">
                 <a:solidFill>
                   <a:srgbClr val="0000FF"/>
                 </a:solidFill>
@@ -16910,7 +16731,7 @@
                 </a:highlight>
                 <a:latin typeface="Lucida Console" panose="020B0609040504020204" pitchFamily="49" charset="0"/>
               </a:rPr>
-              <a:t>'#!/</a:t>
+              <a:t>ksh</a:t>
             </a:r>
             <a:r>
               <a:rPr lang="en-US" sz="2000" b="1" dirty="0">
@@ -16922,10 +16743,10 @@
                 </a:highlight>
                 <a:latin typeface="Lucida Console" panose="020B0609040504020204" pitchFamily="49" charset="0"/>
               </a:rPr>
-              <a:t>bin/</a:t>
-            </a:r>
-            <a:r>
-              <a:rPr lang="en-US" sz="2000" b="1" dirty="0" err="1">
+              <a:t/>
+            </a:r>
+            <a:br>
+              <a:rPr lang="en-US" sz="2000" b="1" dirty="0">
                 <a:solidFill>
                   <a:srgbClr val="0000FF"/>
                 </a:solidFill>
@@ -16934,8 +16755,7 @@
                 </a:highlight>
                 <a:latin typeface="Lucida Console" panose="020B0609040504020204" pitchFamily="49" charset="0"/>
               </a:rPr>
-              <a:t>ksh</a:t>
-            </a:r>
+            </a:br>
             <a:r>
               <a:rPr lang="en-US" sz="2000" b="1" dirty="0">
                 <a:solidFill>
@@ -16946,7 +16766,7 @@
                 </a:highlight>
                 <a:latin typeface="Lucida Console" panose="020B0609040504020204" pitchFamily="49" charset="0"/>
               </a:rPr>
-              <a:t/>
+              <a:t>. /export/home/oracle/set_localASM.sh</a:t>
             </a:r>
             <a:br>
               <a:rPr lang="en-US" sz="2000" b="1" dirty="0">
@@ -16969,66 +16789,7 @@
                 </a:highlight>
                 <a:latin typeface="Lucida Console" panose="020B0609040504020204" pitchFamily="49" charset="0"/>
               </a:rPr>
-              <a:t>. </a:t>
-            </a:r>
-            <a:r>
-              <a:rPr lang="en-US" sz="2000" b="1" dirty="0">
-                <a:solidFill>
-                  <a:srgbClr val="0000FF"/>
-                </a:solidFill>
-                <a:highlight>
-                  <a:srgbClr val="FFFFFF"/>
-                </a:highlight>
-                <a:latin typeface="Lucida Console" panose="020B0609040504020204" pitchFamily="49" charset="0"/>
-              </a:rPr>
-              <a:t>/</a:t>
-            </a:r>
-            <a:r>
-              <a:rPr lang="en-US" sz="2000" b="1" dirty="0">
-                <a:solidFill>
-                  <a:srgbClr val="0000FF"/>
-                </a:solidFill>
-                <a:highlight>
-                  <a:srgbClr val="FFFFFF"/>
-                </a:highlight>
-                <a:latin typeface="Lucida Console" panose="020B0609040504020204" pitchFamily="49" charset="0"/>
-              </a:rPr>
-              <a:t>export/home/oracle/set_localASM.sh</a:t>
-            </a:r>
-            <a:br>
-              <a:rPr lang="en-US" sz="2000" b="1" dirty="0">
-                <a:solidFill>
-                  <a:srgbClr val="0000FF"/>
-                </a:solidFill>
-                <a:highlight>
-                  <a:srgbClr val="FFFFFF"/>
-                </a:highlight>
-                <a:latin typeface="Lucida Console" panose="020B0609040504020204" pitchFamily="49" charset="0"/>
-              </a:rPr>
-            </a:br>
-            <a:r>
-              <a:rPr lang="en-US" sz="2000" b="1" dirty="0">
-                <a:solidFill>
-                  <a:srgbClr val="0000FF"/>
-                </a:solidFill>
-                <a:highlight>
-                  <a:srgbClr val="FFFFFF"/>
-                </a:highlight>
-                <a:latin typeface="Lucida Console" panose="020B0609040504020204" pitchFamily="49" charset="0"/>
-              </a:rPr>
-              <a:t>cat </a:t>
-            </a:r>
-            <a:r>
-              <a:rPr lang="en-US" sz="2000" b="1" dirty="0">
-                <a:solidFill>
-                  <a:srgbClr val="0000FF"/>
-                </a:solidFill>
-                <a:highlight>
-                  <a:srgbClr val="FFFFFF"/>
-                </a:highlight>
-                <a:latin typeface="Lucida Console" panose="020B0609040504020204" pitchFamily="49" charset="0"/>
-              </a:rPr>
-              <a:t>$ORACLE_HOME/network/admin/</a:t>
+              <a:t>cat $ORACLE_HOME/network/admin/</a:t>
             </a:r>
             <a:r>
               <a:rPr lang="en-US" sz="2000" b="1" dirty="0" err="1">
@@ -17161,19 +16922,7 @@
                 </a:highlight>
                 <a:latin typeface="Lucida Console" panose="020B0609040504020204" pitchFamily="49" charset="0"/>
               </a:rPr>
-              <a:t>, </a:t>
-            </a:r>
-            <a:r>
-              <a:rPr lang="en-US" sz="2200" b="1" dirty="0">
-                <a:solidFill>
-                  <a:srgbClr val="000080"/>
-                </a:solidFill>
-                <a:highlight>
-                  <a:srgbClr val="FFFFFF"/>
-                </a:highlight>
-                <a:latin typeface="Lucida Console" panose="020B0609040504020204" pitchFamily="49" charset="0"/>
-              </a:rPr>
-              <a:t>%</a:t>
+              <a:t>, %</a:t>
             </a:r>
             <a:r>
               <a:rPr lang="en-US" sz="2200" b="1" dirty="0">
@@ -17221,22 +16970,22 @@
                 </a:highlight>
                 <a:latin typeface="Lucida Console" panose="020B0609040504020204" pitchFamily="49" charset="0"/>
               </a:rPr>
-              <a:t>m5_proc</a:t>
+              <a:t>m5_proc(</a:t>
             </a:r>
             <a:r>
               <a:rPr lang="en-US" sz="2000" b="1" dirty="0">
                 <a:solidFill>
-                  <a:srgbClr val="000080"/>
+                  <a:srgbClr val="0000FF"/>
                 </a:solidFill>
                 <a:highlight>
                   <a:srgbClr val="FFFFFF"/>
                 </a:highlight>
                 <a:latin typeface="Lucida Console" panose="020B0609040504020204" pitchFamily="49" charset="0"/>
               </a:rPr>
-              <a:t>(</a:t>
-            </a:r>
-            <a:r>
-              <a:rPr lang="en-US" sz="2000" b="1" dirty="0">
+              <a:t>'select ** from </a:t>
+            </a:r>
+            <a:r>
+              <a:rPr lang="en-US" sz="2000" b="1" dirty="0" err="1">
                 <a:solidFill>
                   <a:srgbClr val="0000FF"/>
                 </a:solidFill>
@@ -17245,10 +16994,10 @@
                 </a:highlight>
                 <a:latin typeface="Lucida Console" panose="020B0609040504020204" pitchFamily="49" charset="0"/>
               </a:rPr>
-              <a:t>'select ** from </a:t>
-            </a:r>
-            <a:r>
-              <a:rPr lang="en-US" sz="2000" b="1" dirty="0" err="1">
+              <a:t>dba_audit_trail</a:t>
+            </a:r>
+            <a:r>
+              <a:rPr lang="en-US" sz="2000" b="1" dirty="0">
                 <a:solidFill>
                   <a:srgbClr val="0000FF"/>
                 </a:solidFill>
@@ -17257,10 +17006,10 @@
                 </a:highlight>
                 <a:latin typeface="Lucida Console" panose="020B0609040504020204" pitchFamily="49" charset="0"/>
               </a:rPr>
-              <a:t>dba_audit_trail</a:t>
-            </a:r>
-            <a:r>
-              <a:rPr lang="en-US" sz="2000" b="1" dirty="0">
+              <a:t> where </a:t>
+            </a:r>
+            <a:r>
+              <a:rPr lang="en-US" sz="2000" b="1" dirty="0" err="1">
                 <a:solidFill>
                   <a:srgbClr val="0000FF"/>
                 </a:solidFill>
@@ -17269,7 +17018,7 @@
                 </a:highlight>
                 <a:latin typeface="Lucida Console" panose="020B0609040504020204" pitchFamily="49" charset="0"/>
               </a:rPr>
-              <a:t> </a:t>
+              <a:t>returncode</a:t>
             </a:r>
             <a:r>
               <a:rPr lang="en-US" sz="2000" b="1" dirty="0">
@@ -17281,43 +17030,7 @@
                 </a:highlight>
                 <a:latin typeface="Lucida Console" panose="020B0609040504020204" pitchFamily="49" charset="0"/>
               </a:rPr>
-              <a:t>where </a:t>
-            </a:r>
-            <a:r>
-              <a:rPr lang="en-US" sz="2000" b="1" dirty="0" err="1">
-                <a:solidFill>
-                  <a:srgbClr val="0000FF"/>
-                </a:solidFill>
-                <a:highlight>
-                  <a:srgbClr val="FFFFFF"/>
-                </a:highlight>
-                <a:latin typeface="Lucida Console" panose="020B0609040504020204" pitchFamily="49" charset="0"/>
-              </a:rPr>
-              <a:t>returncode</a:t>
-            </a:r>
-            <a:r>
-              <a:rPr lang="en-US" sz="2000" b="1" dirty="0">
-                <a:solidFill>
-                  <a:srgbClr val="0000FF"/>
-                </a:solidFill>
-                <a:highlight>
-                  <a:srgbClr val="FFFFFF"/>
-                </a:highlight>
-                <a:latin typeface="Lucida Console" panose="020B0609040504020204" pitchFamily="49" charset="0"/>
-              </a:rPr>
-              <a:t> </a:t>
-            </a:r>
-            <a:r>
-              <a:rPr lang="en-US" sz="2000" b="1" dirty="0">
-                <a:solidFill>
-                  <a:srgbClr val="0000FF"/>
-                </a:solidFill>
-                <a:highlight>
-                  <a:srgbClr val="FFFFFF"/>
-                </a:highlight>
-                <a:latin typeface="Lucida Console" panose="020B0609040504020204" pitchFamily="49" charset="0"/>
-              </a:rPr>
-              <a:t>in (1017,2800)'</a:t>
+              <a:t> in (1017,2800)'</a:t>
             </a:r>
             <a:r>
               <a:rPr lang="en-US" sz="2000" b="1" dirty="0">
@@ -17681,19 +17394,7 @@
                 </a:highlight>
                 <a:latin typeface="Lucida Console" panose="020B0609040504020204" pitchFamily="49" charset="0"/>
               </a:rPr>
-              <a:t>'DBA</a:t>
-            </a:r>
-            <a:r>
-              <a:rPr lang="en-US" sz="2000" b="1" dirty="0">
-                <a:solidFill>
-                  <a:srgbClr val="0000FF"/>
-                </a:solidFill>
-                <a:highlight>
-                  <a:srgbClr val="FFFFFF"/>
-                </a:highlight>
-                <a:latin typeface="Lucida Console" panose="020B0609040504020204" pitchFamily="49" charset="0"/>
-              </a:rPr>
-              <a:t>'</a:t>
+              <a:t>'DBA'</a:t>
             </a:r>
             <a:r>
               <a:rPr lang="en-US" sz="2000" b="1" dirty="0">
@@ -18636,7 +18337,6 @@
               <a:rPr lang="en-US" sz="2800" dirty="0"/>
               <a:t>DBA at Ventech Solutions in Urbandale, Iowa</a:t>
             </a:r>
-            <a:endParaRPr lang="en-US" sz="2800" dirty="0"/>
           </a:p>
           <a:p>
             <a:pPr marL="514337" indent="-514337">
@@ -20403,19 +20103,7 @@
                 </a:highlight>
                 <a:latin typeface="Courier New"/>
               </a:rPr>
-              <a:t>'select </a:t>
-            </a:r>
-            <a:r>
-              <a:rPr lang="en-US" sz="5000" b="1" dirty="0">
-                <a:solidFill>
-                  <a:srgbClr val="0000FF"/>
-                </a:solidFill>
-                <a:highlight>
-                  <a:srgbClr val="FFFFFF"/>
-                </a:highlight>
-                <a:latin typeface="Courier New"/>
-              </a:rPr>
-              <a:t>* from dual'</a:t>
+              <a:t>'select * from dual'</a:t>
             </a:r>
             <a:r>
               <a:rPr lang="en-US" sz="5000" b="1" dirty="0">
@@ -20578,19 +20266,7 @@
                 </a:highlight>
                 <a:latin typeface="Courier New"/>
               </a:rPr>
-              <a:t>  m5_proc</a:t>
-            </a:r>
-            <a:r>
-              <a:rPr lang="en-US" sz="4000" b="1" dirty="0">
-                <a:solidFill>
-                  <a:srgbClr val="000080"/>
-                </a:solidFill>
-                <a:highlight>
-                  <a:srgbClr val="FFFFFF"/>
-                </a:highlight>
-                <a:latin typeface="Courier New"/>
-              </a:rPr>
-              <a:t>(</a:t>
+              <a:t>  m5_proc(</a:t>
             </a:r>
           </a:p>
           <a:p>
@@ -20656,6 +20332,367 @@
                 <a:latin typeface="Courier New"/>
               </a:rPr>
               <a:t>,</a:t>
+            </a:r>
+          </a:p>
+          <a:p>
+            <a:pPr marL="0" indent="0">
+              <a:buNone/>
+            </a:pPr>
+            <a:r>
+              <a:rPr lang="en-US" sz="4000" b="1" dirty="0">
+                <a:solidFill>
+                  <a:srgbClr val="000080"/>
+                </a:solidFill>
+                <a:highlight>
+                  <a:srgbClr val="FFFFFF"/>
+                </a:highlight>
+                <a:latin typeface="Courier New"/>
+              </a:rPr>
+              <a:t>    </a:t>
+            </a:r>
+            <a:r>
+              <a:rPr lang="en-US" sz="4000" b="1" dirty="0" err="1">
+                <a:solidFill>
+                  <a:srgbClr val="000080"/>
+                </a:solidFill>
+                <a:highlight>
+                  <a:srgbClr val="FFFFFF"/>
+                </a:highlight>
+                <a:latin typeface="Courier New"/>
+              </a:rPr>
+              <a:t>p_targets</a:t>
+            </a:r>
+            <a:r>
+              <a:rPr lang="en-US" sz="4000" b="1" dirty="0">
+                <a:solidFill>
+                  <a:srgbClr val="000080"/>
+                </a:solidFill>
+                <a:highlight>
+                  <a:srgbClr val="FFFFFF"/>
+                </a:highlight>
+                <a:latin typeface="Courier New"/>
+              </a:rPr>
+              <a:t>             =&gt; </a:t>
+            </a:r>
+            <a:r>
+              <a:rPr lang="en-US" sz="4000" b="1" dirty="0">
+                <a:solidFill>
+                  <a:srgbClr val="0000FF"/>
+                </a:solidFill>
+                <a:highlight>
+                  <a:srgbClr val="FFFFFF"/>
+                </a:highlight>
+                <a:latin typeface="Courier New"/>
+              </a:rPr>
+              <a:t>'</a:t>
+            </a:r>
+            <a:r>
+              <a:rPr lang="en-US" sz="4000" b="1" dirty="0" err="1">
+                <a:solidFill>
+                  <a:srgbClr val="0000FF"/>
+                </a:solidFill>
+                <a:highlight>
+                  <a:srgbClr val="FFFFFF"/>
+                </a:highlight>
+                <a:latin typeface="Courier New"/>
+              </a:rPr>
+              <a:t>dev,qa</a:t>
+            </a:r>
+            <a:r>
+              <a:rPr lang="en-US" sz="4000" b="1" dirty="0">
+                <a:solidFill>
+                  <a:srgbClr val="0000FF"/>
+                </a:solidFill>
+                <a:highlight>
+                  <a:srgbClr val="FFFFFF"/>
+                </a:highlight>
+                <a:latin typeface="Courier New"/>
+              </a:rPr>
+              <a:t>'</a:t>
+            </a:r>
+            <a:r>
+              <a:rPr lang="en-US" sz="4000" b="1" dirty="0">
+                <a:solidFill>
+                  <a:srgbClr val="000080"/>
+                </a:solidFill>
+                <a:highlight>
+                  <a:srgbClr val="FFFFFF"/>
+                </a:highlight>
+                <a:latin typeface="Courier New"/>
+              </a:rPr>
+              <a:t>,</a:t>
+            </a:r>
+          </a:p>
+          <a:p>
+            <a:pPr marL="0" indent="0">
+              <a:buNone/>
+            </a:pPr>
+            <a:r>
+              <a:rPr lang="en-US" sz="4000" b="1" dirty="0">
+                <a:solidFill>
+                  <a:srgbClr val="000080"/>
+                </a:solidFill>
+                <a:highlight>
+                  <a:srgbClr val="FFFFFF"/>
+                </a:highlight>
+                <a:latin typeface="Courier New"/>
+              </a:rPr>
+              <a:t>    </a:t>
+            </a:r>
+            <a:r>
+              <a:rPr lang="en-US" sz="4000" b="1" dirty="0" err="1">
+                <a:solidFill>
+                  <a:srgbClr val="000080"/>
+                </a:solidFill>
+                <a:highlight>
+                  <a:srgbClr val="FFFFFF"/>
+                </a:highlight>
+                <a:latin typeface="Courier New"/>
+              </a:rPr>
+              <a:t>p_table_name</a:t>
+            </a:r>
+            <a:r>
+              <a:rPr lang="en-US" sz="4000" b="1" dirty="0">
+                <a:solidFill>
+                  <a:srgbClr val="000080"/>
+                </a:solidFill>
+                <a:highlight>
+                  <a:srgbClr val="FFFFFF"/>
+                </a:highlight>
+                <a:latin typeface="Courier New"/>
+              </a:rPr>
+              <a:t>          =&gt; </a:t>
+            </a:r>
+            <a:r>
+              <a:rPr lang="en-US" sz="4000" b="1" dirty="0">
+                <a:solidFill>
+                  <a:srgbClr val="0000FF"/>
+                </a:solidFill>
+                <a:highlight>
+                  <a:srgbClr val="FFFFFF"/>
+                </a:highlight>
+                <a:latin typeface="Courier New"/>
+              </a:rPr>
+              <a:t>'</a:t>
+            </a:r>
+            <a:r>
+              <a:rPr lang="en-US" sz="4000" b="1" dirty="0" err="1">
+                <a:solidFill>
+                  <a:srgbClr val="0000FF"/>
+                </a:solidFill>
+                <a:highlight>
+                  <a:srgbClr val="FFFFFF"/>
+                </a:highlight>
+                <a:latin typeface="Courier New"/>
+              </a:rPr>
+              <a:t>test_data</a:t>
+            </a:r>
+            <a:r>
+              <a:rPr lang="en-US" sz="4000" b="1" dirty="0">
+                <a:solidFill>
+                  <a:srgbClr val="0000FF"/>
+                </a:solidFill>
+                <a:highlight>
+                  <a:srgbClr val="FFFFFF"/>
+                </a:highlight>
+                <a:latin typeface="Courier New"/>
+              </a:rPr>
+              <a:t>'</a:t>
+            </a:r>
+            <a:r>
+              <a:rPr lang="en-US" sz="4000" b="1" dirty="0">
+                <a:solidFill>
+                  <a:srgbClr val="000080"/>
+                </a:solidFill>
+                <a:highlight>
+                  <a:srgbClr val="FFFFFF"/>
+                </a:highlight>
+                <a:latin typeface="Courier New"/>
+              </a:rPr>
+              <a:t>,</a:t>
+            </a:r>
+          </a:p>
+          <a:p>
+            <a:pPr marL="0" indent="0">
+              <a:buNone/>
+            </a:pPr>
+            <a:r>
+              <a:rPr lang="en-US" sz="4000" b="1" dirty="0">
+                <a:solidFill>
+                  <a:srgbClr val="000080"/>
+                </a:solidFill>
+                <a:highlight>
+                  <a:srgbClr val="FFFFFF"/>
+                </a:highlight>
+                <a:latin typeface="Courier New"/>
+              </a:rPr>
+              <a:t>    </a:t>
+            </a:r>
+            <a:r>
+              <a:rPr lang="en-US" sz="4000" b="1" dirty="0" err="1">
+                <a:solidFill>
+                  <a:srgbClr val="000080"/>
+                </a:solidFill>
+                <a:highlight>
+                  <a:srgbClr val="FFFFFF"/>
+                </a:highlight>
+                <a:latin typeface="Courier New"/>
+              </a:rPr>
+              <a:t>p_table_exists_action</a:t>
+            </a:r>
+            <a:r>
+              <a:rPr lang="en-US" sz="4000" b="1" dirty="0">
+                <a:solidFill>
+                  <a:srgbClr val="000080"/>
+                </a:solidFill>
+                <a:highlight>
+                  <a:srgbClr val="FFFFFF"/>
+                </a:highlight>
+                <a:latin typeface="Courier New"/>
+              </a:rPr>
+              <a:t> =&gt; </a:t>
+            </a:r>
+            <a:r>
+              <a:rPr lang="en-US" sz="4000" b="1" dirty="0">
+                <a:solidFill>
+                  <a:srgbClr val="0000FF"/>
+                </a:solidFill>
+                <a:highlight>
+                  <a:srgbClr val="FFFFFF"/>
+                </a:highlight>
+                <a:latin typeface="Courier New"/>
+              </a:rPr>
+              <a:t>'drop'</a:t>
+            </a:r>
+            <a:r>
+              <a:rPr lang="en-US" sz="4000" b="1" dirty="0">
+                <a:solidFill>
+                  <a:srgbClr val="000080"/>
+                </a:solidFill>
+                <a:highlight>
+                  <a:srgbClr val="FFFFFF"/>
+                </a:highlight>
+                <a:latin typeface="Courier New"/>
+              </a:rPr>
+              <a:t>,</a:t>
+            </a:r>
+          </a:p>
+          <a:p>
+            <a:pPr marL="0" indent="0">
+              <a:buNone/>
+            </a:pPr>
+            <a:r>
+              <a:rPr lang="en-US" sz="4000" b="1" dirty="0">
+                <a:solidFill>
+                  <a:srgbClr val="000080"/>
+                </a:solidFill>
+                <a:highlight>
+                  <a:srgbClr val="FFFFFF"/>
+                </a:highlight>
+                <a:latin typeface="Courier New"/>
+              </a:rPr>
+              <a:t>    </a:t>
+            </a:r>
+            <a:r>
+              <a:rPr lang="en-US" sz="4000" b="1" dirty="0" err="1">
+                <a:solidFill>
+                  <a:srgbClr val="000080"/>
+                </a:solidFill>
+                <a:highlight>
+                  <a:srgbClr val="FFFFFF"/>
+                </a:highlight>
+                <a:latin typeface="Courier New"/>
+              </a:rPr>
+              <a:t>p_asynchronous</a:t>
+            </a:r>
+            <a:r>
+              <a:rPr lang="en-US" sz="4000" b="1" dirty="0">
+                <a:solidFill>
+                  <a:srgbClr val="000080"/>
+                </a:solidFill>
+                <a:highlight>
+                  <a:srgbClr val="FFFFFF"/>
+                </a:highlight>
+                <a:latin typeface="Courier New"/>
+              </a:rPr>
+              <a:t>        =&gt; </a:t>
+            </a:r>
+            <a:r>
+              <a:rPr lang="en-US" sz="4000" b="1" dirty="0">
+                <a:solidFill>
+                  <a:srgbClr val="008080"/>
+                </a:solidFill>
+                <a:highlight>
+                  <a:srgbClr val="FFFFFF"/>
+                </a:highlight>
+                <a:latin typeface="Courier New"/>
+              </a:rPr>
+              <a:t>true</a:t>
+            </a:r>
+            <a:r>
+              <a:rPr lang="en-US" sz="4000" b="1" dirty="0">
+                <a:solidFill>
+                  <a:srgbClr val="000080"/>
+                </a:solidFill>
+                <a:highlight>
+                  <a:srgbClr val="FFFFFF"/>
+                </a:highlight>
+                <a:latin typeface="Courier New"/>
+              </a:rPr>
+              <a:t>,</a:t>
+            </a:r>
+          </a:p>
+          <a:p>
+            <a:pPr marL="0" indent="0">
+              <a:buNone/>
+            </a:pPr>
+            <a:r>
+              <a:rPr lang="en-US" sz="4000" b="1" dirty="0">
+                <a:solidFill>
+                  <a:srgbClr val="000080"/>
+                </a:solidFill>
+                <a:highlight>
+                  <a:srgbClr val="FFFFFF"/>
+                </a:highlight>
+                <a:latin typeface="Courier New"/>
+              </a:rPr>
+              <a:t>    </a:t>
+            </a:r>
+            <a:r>
+              <a:rPr lang="en-US" sz="4000" b="1" dirty="0" err="1">
+                <a:solidFill>
+                  <a:srgbClr val="000080"/>
+                </a:solidFill>
+                <a:highlight>
+                  <a:srgbClr val="FFFFFF"/>
+                </a:highlight>
+                <a:latin typeface="Courier New"/>
+              </a:rPr>
+              <a:t>p_run_as_sys</a:t>
+            </a:r>
+            <a:r>
+              <a:rPr lang="en-US" sz="4000" b="1" dirty="0">
+                <a:solidFill>
+                  <a:srgbClr val="000080"/>
+                </a:solidFill>
+                <a:highlight>
+                  <a:srgbClr val="FFFFFF"/>
+                </a:highlight>
+                <a:latin typeface="Courier New"/>
+              </a:rPr>
+              <a:t>          =&gt; </a:t>
+            </a:r>
+            <a:r>
+              <a:rPr lang="en-US" sz="4000" b="1" dirty="0">
+                <a:solidFill>
+                  <a:srgbClr val="008080"/>
+                </a:solidFill>
+                <a:highlight>
+                  <a:srgbClr val="FFFFFF"/>
+                </a:highlight>
+                <a:latin typeface="Courier New"/>
+              </a:rPr>
+              <a:t>false</a:t>
             </a:r>
             <a:endParaRPr lang="en-US" sz="4000" b="1" dirty="0">
               <a:solidFill>
@@ -20681,408 +20718,8 @@
                 </a:highlight>
                 <a:latin typeface="Courier New"/>
               </a:rPr>
-              <a:t>    </a:t>
-            </a:r>
-            <a:r>
-              <a:rPr lang="en-US" sz="4000" b="1" dirty="0" err="1">
-                <a:solidFill>
-                  <a:srgbClr val="000080"/>
-                </a:solidFill>
-                <a:highlight>
-                  <a:srgbClr val="FFFFFF"/>
-                </a:highlight>
-                <a:latin typeface="Courier New"/>
-              </a:rPr>
-              <a:t>p_targets</a:t>
-            </a:r>
-            <a:r>
-              <a:rPr lang="en-US" sz="4000" b="1" dirty="0">
-                <a:solidFill>
-                  <a:srgbClr val="000080"/>
-                </a:solidFill>
-                <a:highlight>
-                  <a:srgbClr val="FFFFFF"/>
-                </a:highlight>
-                <a:latin typeface="Courier New"/>
-              </a:rPr>
-              <a:t>             =&gt; </a:t>
-            </a:r>
-            <a:r>
-              <a:rPr lang="en-US" sz="4000" b="1" dirty="0">
-                <a:solidFill>
-                  <a:srgbClr val="0000FF"/>
-                </a:solidFill>
-                <a:highlight>
-                  <a:srgbClr val="FFFFFF"/>
-                </a:highlight>
-                <a:latin typeface="Courier New"/>
-              </a:rPr>
-              <a:t>'</a:t>
-            </a:r>
-            <a:r>
-              <a:rPr lang="en-US" sz="4000" b="1" dirty="0" err="1">
-                <a:solidFill>
-                  <a:srgbClr val="0000FF"/>
-                </a:solidFill>
-                <a:highlight>
-                  <a:srgbClr val="FFFFFF"/>
-                </a:highlight>
-                <a:latin typeface="Courier New"/>
-              </a:rPr>
-              <a:t>dev,qa</a:t>
-            </a:r>
-            <a:r>
-              <a:rPr lang="en-US" sz="4000" b="1" dirty="0">
-                <a:solidFill>
-                  <a:srgbClr val="0000FF"/>
-                </a:solidFill>
-                <a:highlight>
-                  <a:srgbClr val="FFFFFF"/>
-                </a:highlight>
-                <a:latin typeface="Courier New"/>
-              </a:rPr>
-              <a:t>'</a:t>
-            </a:r>
-            <a:r>
-              <a:rPr lang="en-US" sz="4000" b="1" dirty="0">
-                <a:solidFill>
-                  <a:srgbClr val="000080"/>
-                </a:solidFill>
-                <a:highlight>
-                  <a:srgbClr val="FFFFFF"/>
-                </a:highlight>
-                <a:latin typeface="Courier New"/>
-              </a:rPr>
-              <a:t>,</a:t>
-            </a:r>
-          </a:p>
-          <a:p>
-            <a:pPr marL="0" indent="0">
-              <a:buNone/>
-            </a:pPr>
-            <a:r>
-              <a:rPr lang="en-US" sz="4000" b="1" dirty="0">
-                <a:solidFill>
-                  <a:srgbClr val="000080"/>
-                </a:solidFill>
-                <a:highlight>
-                  <a:srgbClr val="FFFFFF"/>
-                </a:highlight>
-                <a:latin typeface="Courier New"/>
-              </a:rPr>
-              <a:t>    </a:t>
-            </a:r>
-            <a:r>
-              <a:rPr lang="en-US" sz="4000" b="1" dirty="0" err="1">
-                <a:solidFill>
-                  <a:srgbClr val="000080"/>
-                </a:solidFill>
-                <a:highlight>
-                  <a:srgbClr val="FFFFFF"/>
-                </a:highlight>
-                <a:latin typeface="Courier New"/>
-              </a:rPr>
-              <a:t>p_table_name</a:t>
-            </a:r>
-            <a:r>
-              <a:rPr lang="en-US" sz="4000" b="1" dirty="0">
-                <a:solidFill>
-                  <a:srgbClr val="000080"/>
-                </a:solidFill>
-                <a:highlight>
-                  <a:srgbClr val="FFFFFF"/>
-                </a:highlight>
-                <a:latin typeface="Courier New"/>
-              </a:rPr>
-              <a:t>          =&gt; </a:t>
-            </a:r>
-            <a:r>
-              <a:rPr lang="en-US" sz="4000" b="1" dirty="0">
-                <a:solidFill>
-                  <a:srgbClr val="0000FF"/>
-                </a:solidFill>
-                <a:highlight>
-                  <a:srgbClr val="FFFFFF"/>
-                </a:highlight>
-                <a:latin typeface="Courier New"/>
-              </a:rPr>
-              <a:t>'</a:t>
-            </a:r>
-            <a:r>
-              <a:rPr lang="en-US" sz="4000" b="1" dirty="0" err="1">
-                <a:solidFill>
-                  <a:srgbClr val="0000FF"/>
-                </a:solidFill>
-                <a:highlight>
-                  <a:srgbClr val="FFFFFF"/>
-                </a:highlight>
-                <a:latin typeface="Courier New"/>
-              </a:rPr>
-              <a:t>test_data</a:t>
-            </a:r>
-            <a:r>
-              <a:rPr lang="en-US" sz="4000" b="1" dirty="0">
-                <a:solidFill>
-                  <a:srgbClr val="0000FF"/>
-                </a:solidFill>
-                <a:highlight>
-                  <a:srgbClr val="FFFFFF"/>
-                </a:highlight>
-                <a:latin typeface="Courier New"/>
-              </a:rPr>
-              <a:t>'</a:t>
-            </a:r>
-            <a:r>
-              <a:rPr lang="en-US" sz="4000" b="1" dirty="0">
-                <a:solidFill>
-                  <a:srgbClr val="000080"/>
-                </a:solidFill>
-                <a:highlight>
-                  <a:srgbClr val="FFFFFF"/>
-                </a:highlight>
-                <a:latin typeface="Courier New"/>
-              </a:rPr>
-              <a:t>,</a:t>
-            </a:r>
-          </a:p>
-          <a:p>
-            <a:pPr marL="0" indent="0">
-              <a:buNone/>
-            </a:pPr>
-            <a:r>
-              <a:rPr lang="en-US" sz="4000" b="1" dirty="0">
-                <a:solidFill>
-                  <a:srgbClr val="000080"/>
-                </a:solidFill>
-                <a:highlight>
-                  <a:srgbClr val="FFFFFF"/>
-                </a:highlight>
-                <a:latin typeface="Courier New"/>
-              </a:rPr>
-              <a:t>    </a:t>
-            </a:r>
-            <a:r>
-              <a:rPr lang="en-US" sz="4000" b="1" dirty="0" err="1">
-                <a:solidFill>
-                  <a:srgbClr val="000080"/>
-                </a:solidFill>
-                <a:highlight>
-                  <a:srgbClr val="FFFFFF"/>
-                </a:highlight>
-                <a:latin typeface="Courier New"/>
-              </a:rPr>
-              <a:t>p_table_exists_action</a:t>
-            </a:r>
-            <a:r>
-              <a:rPr lang="en-US" sz="4000" b="1" dirty="0">
-                <a:solidFill>
-                  <a:srgbClr val="000080"/>
-                </a:solidFill>
-                <a:highlight>
-                  <a:srgbClr val="FFFFFF"/>
-                </a:highlight>
-                <a:latin typeface="Courier New"/>
-              </a:rPr>
-              <a:t> </a:t>
-            </a:r>
-            <a:r>
-              <a:rPr lang="en-US" sz="4000" b="1" dirty="0">
-                <a:solidFill>
-                  <a:srgbClr val="000080"/>
-                </a:solidFill>
-                <a:highlight>
-                  <a:srgbClr val="FFFFFF"/>
-                </a:highlight>
-                <a:latin typeface="Courier New"/>
-              </a:rPr>
-              <a:t>=&gt; </a:t>
-            </a:r>
-            <a:r>
-              <a:rPr lang="en-US" sz="4000" b="1" dirty="0">
-                <a:solidFill>
-                  <a:srgbClr val="0000FF"/>
-                </a:solidFill>
-                <a:highlight>
-                  <a:srgbClr val="FFFFFF"/>
-                </a:highlight>
-                <a:latin typeface="Courier New"/>
-              </a:rPr>
-              <a:t>'drop'</a:t>
-            </a:r>
-            <a:r>
-              <a:rPr lang="en-US" sz="4000" b="1" dirty="0">
-                <a:solidFill>
-                  <a:srgbClr val="000080"/>
-                </a:solidFill>
-                <a:highlight>
-                  <a:srgbClr val="FFFFFF"/>
-                </a:highlight>
-                <a:latin typeface="Courier New"/>
-              </a:rPr>
-              <a:t>,</a:t>
-            </a:r>
-          </a:p>
-          <a:p>
-            <a:pPr marL="0" indent="0">
-              <a:buNone/>
-            </a:pPr>
-            <a:r>
-              <a:rPr lang="en-US" sz="4000" b="1" dirty="0">
-                <a:solidFill>
-                  <a:srgbClr val="000080"/>
-                </a:solidFill>
-                <a:highlight>
-                  <a:srgbClr val="FFFFFF"/>
-                </a:highlight>
-                <a:latin typeface="Courier New"/>
-              </a:rPr>
-              <a:t>    </a:t>
-            </a:r>
-            <a:r>
-              <a:rPr lang="en-US" sz="4000" b="1" dirty="0" err="1">
-                <a:solidFill>
-                  <a:srgbClr val="000080"/>
-                </a:solidFill>
-                <a:highlight>
-                  <a:srgbClr val="FFFFFF"/>
-                </a:highlight>
-                <a:latin typeface="Courier New"/>
-              </a:rPr>
-              <a:t>p_asynchronous</a:t>
-            </a:r>
-            <a:r>
-              <a:rPr lang="en-US" sz="4000" b="1" dirty="0">
-                <a:solidFill>
-                  <a:srgbClr val="000080"/>
-                </a:solidFill>
-                <a:highlight>
-                  <a:srgbClr val="FFFFFF"/>
-                </a:highlight>
-                <a:latin typeface="Courier New"/>
-              </a:rPr>
-              <a:t>        =&gt; </a:t>
-            </a:r>
-            <a:r>
-              <a:rPr lang="en-US" sz="4000" b="1" dirty="0">
-                <a:solidFill>
-                  <a:srgbClr val="008080"/>
-                </a:solidFill>
-                <a:highlight>
-                  <a:srgbClr val="FFFFFF"/>
-                </a:highlight>
-                <a:latin typeface="Courier New"/>
-              </a:rPr>
-              <a:t>true</a:t>
-            </a:r>
-            <a:r>
-              <a:rPr lang="en-US" sz="4000" b="1" dirty="0">
-                <a:solidFill>
-                  <a:srgbClr val="000080"/>
-                </a:solidFill>
-                <a:highlight>
-                  <a:srgbClr val="FFFFFF"/>
-                </a:highlight>
-                <a:latin typeface="Courier New"/>
-              </a:rPr>
-              <a:t>,</a:t>
-            </a:r>
-            <a:endParaRPr lang="en-US" sz="4000" b="1" dirty="0">
-              <a:solidFill>
-                <a:srgbClr val="000080"/>
-              </a:solidFill>
-              <a:highlight>
-                <a:srgbClr val="FFFFFF"/>
-              </a:highlight>
-              <a:latin typeface="Courier New"/>
-            </a:endParaRPr>
-          </a:p>
-          <a:p>
-            <a:pPr marL="0" indent="0">
-              <a:buNone/>
-            </a:pPr>
-            <a:r>
-              <a:rPr lang="en-US" sz="4000" b="1" dirty="0">
-                <a:solidFill>
-                  <a:srgbClr val="000080"/>
-                </a:solidFill>
-                <a:highlight>
-                  <a:srgbClr val="FFFFFF"/>
-                </a:highlight>
-                <a:latin typeface="Courier New"/>
-              </a:rPr>
-              <a:t>    </a:t>
-            </a:r>
-            <a:r>
-              <a:rPr lang="en-US" sz="4000" b="1" dirty="0" err="1">
-                <a:solidFill>
-                  <a:srgbClr val="000080"/>
-                </a:solidFill>
-                <a:highlight>
-                  <a:srgbClr val="FFFFFF"/>
-                </a:highlight>
-                <a:latin typeface="Courier New"/>
-              </a:rPr>
-              <a:t>p_run_as_sys</a:t>
-            </a:r>
-            <a:r>
-              <a:rPr lang="en-US" sz="4000" b="1" dirty="0">
-                <a:solidFill>
-                  <a:srgbClr val="000080"/>
-                </a:solidFill>
-                <a:highlight>
-                  <a:srgbClr val="FFFFFF"/>
-                </a:highlight>
-                <a:latin typeface="Courier New"/>
-              </a:rPr>
-              <a:t>          =&gt; </a:t>
-            </a:r>
-            <a:r>
-              <a:rPr lang="en-US" sz="4000" b="1" dirty="0">
-                <a:solidFill>
-                  <a:srgbClr val="008080"/>
-                </a:solidFill>
-                <a:highlight>
-                  <a:srgbClr val="FFFFFF"/>
-                </a:highlight>
-                <a:latin typeface="Courier New"/>
-              </a:rPr>
-              <a:t>false</a:t>
-            </a:r>
-            <a:endParaRPr lang="en-US" sz="4000" b="1" dirty="0">
-              <a:solidFill>
-                <a:srgbClr val="000080"/>
-              </a:solidFill>
-              <a:highlight>
-                <a:srgbClr val="FFFFFF"/>
-              </a:highlight>
-              <a:latin typeface="Courier New"/>
-            </a:endParaRPr>
-          </a:p>
-          <a:p>
-            <a:pPr marL="0" indent="0">
-              <a:buNone/>
-            </a:pPr>
-            <a:r>
-              <a:rPr lang="en-US" sz="4000" b="1" dirty="0">
-                <a:solidFill>
-                  <a:srgbClr val="000080"/>
-                </a:solidFill>
-                <a:highlight>
-                  <a:srgbClr val="FFFFFF"/>
-                </a:highlight>
-                <a:latin typeface="Courier New"/>
-              </a:rPr>
               <a:t>);</a:t>
             </a:r>
-            <a:endParaRPr lang="en-US" sz="4000" b="1" dirty="0">
-              <a:solidFill>
-                <a:srgbClr val="000080"/>
-              </a:solidFill>
-              <a:highlight>
-                <a:srgbClr val="FFFFFF"/>
-              </a:highlight>
-              <a:latin typeface="Courier New"/>
-            </a:endParaRPr>
           </a:p>
           <a:p>
             <a:pPr marL="0" indent="0">
@@ -21227,7 +20864,6 @@
               <a:rPr lang="en-US" sz="2800" dirty="0"/>
               <a:t>WHAT</a:t>
             </a:r>
-            <a:endParaRPr lang="en-US" sz="2800" dirty="0"/>
           </a:p>
         </p:txBody>
       </p:sp>
@@ -21271,7 +20907,6 @@
               <a:rPr lang="en-US" sz="2800" dirty="0"/>
               <a:t>WHERE</a:t>
             </a:r>
-            <a:endParaRPr lang="en-US" sz="2800" dirty="0"/>
           </a:p>
         </p:txBody>
       </p:sp>
@@ -21359,7 +20994,6 @@
               <a:rPr lang="en-US" sz="2800" dirty="0"/>
               <a:t>WHERE</a:t>
             </a:r>
-            <a:endParaRPr lang="en-US" sz="2800" dirty="0"/>
           </a:p>
         </p:txBody>
       </p:sp>
@@ -21403,7 +21037,6 @@
               <a:rPr lang="en-US" sz="2800" dirty="0"/>
               <a:t>HOW</a:t>
             </a:r>
-            <a:endParaRPr lang="en-US" sz="2800" dirty="0"/>
           </a:p>
         </p:txBody>
       </p:sp>
@@ -22001,7 +21634,7 @@
   <a:extraClrSchemeLst/>
   <a:extLst>
     <a:ext uri="{05A4C25C-085E-4340-85A3-A5531E510DB2}">
-      <thm15:themeFamily xmlns:thm15="http://schemas.microsoft.com/office/thememl/2012/main" xmlns="" name="Office Theme" id="{62F939B6-93AF-4DB8-9C6B-D6C7DFDC589F}" vid="{4A3C46E8-61CC-4603-A589-7422A47A8E4A}"/>
+      <thm15:themeFamily xmlns="" xmlns:thm15="http://schemas.microsoft.com/office/thememl/2012/main" name="Office Theme" id="{62F939B6-93AF-4DB8-9C6B-D6C7DFDC589F}" vid="{4A3C46E8-61CC-4603-A589-7422A47A8E4A}"/>
     </a:ext>
   </a:extLst>
 </a:theme>

</xml_diff>